<commit_message>
the 20201120 afternoon version
</commit_message>
<xml_diff>
--- a/tutorials/Tensorflow-TBO/TutorialLibsvm.pptx
+++ b/tutorials/Tensorflow-TBO/TutorialLibsvm.pptx
@@ -129,6 +129,11 @@
       </a:defRPr>
     </a:lvl9pPr>
   </p:defaultTextStyle>
+  <p:extLst>
+    <p:ext uri="{EFAFB233-063F-42B5-8137-9DF3F51BA10A}">
+      <p15:sldGuideLst xmlns:p15="http://schemas.microsoft.com/office/powerpoint/2012/main"/>
+    </p:ext>
+  </p:extLst>
 </p:presentation>
 </file>
 
@@ -214,7 +219,7 @@
           <a:p>
             <a:fld id="{BDB9890C-22AE-4A7A-923C-F2FC70EBD9B9}" type="datetimeFigureOut">
               <a:rPr lang="zh-TW" altLang="en-US" smtClean="0"/>
-              <a:t>2020/8/17</a:t>
+              <a:t>2020/11/20</a:t>
             </a:fld>
             <a:endParaRPr lang="zh-TW" altLang="en-US"/>
           </a:p>
@@ -736,7 +741,7 @@
           <a:p>
             <a:fld id="{48A87A34-81AB-432B-8DAE-1953F412C126}" type="datetimeFigureOut">
               <a:rPr lang="en-US" dirty="0"/>
-              <a:t>8/17/2020</a:t>
+              <a:t>11/20/2020</a:t>
             </a:fld>
             <a:endParaRPr lang="en-US" dirty="0"/>
           </a:p>
@@ -1046,7 +1051,7 @@
           <a:p>
             <a:fld id="{48A87A34-81AB-432B-8DAE-1953F412C126}" type="datetimeFigureOut">
               <a:rPr lang="en-US" dirty="0"/>
-              <a:t>8/17/2020</a:t>
+              <a:t>11/20/2020</a:t>
             </a:fld>
             <a:endParaRPr lang="en-US" dirty="0"/>
           </a:p>
@@ -1263,7 +1268,7 @@
           <a:p>
             <a:fld id="{48A87A34-81AB-432B-8DAE-1953F412C126}" type="datetimeFigureOut">
               <a:rPr lang="en-US" dirty="0"/>
-              <a:t>8/17/2020</a:t>
+              <a:t>11/20/2020</a:t>
             </a:fld>
             <a:endParaRPr lang="en-US" dirty="0"/>
           </a:p>
@@ -1549,7 +1554,7 @@
           <a:p>
             <a:fld id="{48A87A34-81AB-432B-8DAE-1953F412C126}" type="datetimeFigureOut">
               <a:rPr lang="en-US" dirty="0"/>
-              <a:t>8/17/2020</a:t>
+              <a:t>11/20/2020</a:t>
             </a:fld>
             <a:endParaRPr lang="en-US" dirty="0"/>
           </a:p>
@@ -1998,7 +2003,7 @@
           <a:p>
             <a:fld id="{48A87A34-81AB-432B-8DAE-1953F412C126}" type="datetimeFigureOut">
               <a:rPr lang="en-US" dirty="0"/>
-              <a:t>8/17/2020</a:t>
+              <a:t>11/20/2020</a:t>
             </a:fld>
             <a:endParaRPr lang="en-US" dirty="0"/>
           </a:p>
@@ -2569,7 +2574,7 @@
           <a:p>
             <a:fld id="{48A87A34-81AB-432B-8DAE-1953F412C126}" type="datetimeFigureOut">
               <a:rPr lang="en-US" dirty="0"/>
-              <a:t>8/17/2020</a:t>
+              <a:t>11/20/2020</a:t>
             </a:fld>
             <a:endParaRPr lang="en-US" dirty="0"/>
           </a:p>
@@ -3425,7 +3430,7 @@
           <a:p>
             <a:fld id="{48A87A34-81AB-432B-8DAE-1953F412C126}" type="datetimeFigureOut">
               <a:rPr lang="en-US" dirty="0"/>
-              <a:t>8/17/2020</a:t>
+              <a:t>11/20/2020</a:t>
             </a:fld>
             <a:endParaRPr lang="en-US" dirty="0"/>
           </a:p>
@@ -3625,7 +3630,7 @@
           <a:p>
             <a:fld id="{48A87A34-81AB-432B-8DAE-1953F412C126}" type="datetimeFigureOut">
               <a:rPr lang="en-US" dirty="0"/>
-              <a:t>8/17/2020</a:t>
+              <a:t>11/20/2020</a:t>
             </a:fld>
             <a:endParaRPr lang="en-US" dirty="0"/>
           </a:p>
@@ -3834,7 +3839,7 @@
           <a:p>
             <a:fld id="{48A87A34-81AB-432B-8DAE-1953F412C126}" type="datetimeFigureOut">
               <a:rPr lang="en-US" dirty="0"/>
-              <a:t>8/17/2020</a:t>
+              <a:t>11/20/2020</a:t>
             </a:fld>
             <a:endParaRPr lang="en-US" dirty="0"/>
           </a:p>
@@ -3999,7 +4004,7 @@
           <a:p>
             <a:fld id="{87C7C109-C4BD-4D7E-8929-66C336CB1AA2}" type="datetimeFigureOut">
               <a:rPr lang="zh-TW" altLang="en-US" smtClean="0"/>
-              <a:t>2020/8/17</a:t>
+              <a:t>2020/11/20</a:t>
             </a:fld>
             <a:endParaRPr lang="zh-TW" altLang="en-US"/>
           </a:p>
@@ -4204,7 +4209,7 @@
           <a:p>
             <a:fld id="{48A87A34-81AB-432B-8DAE-1953F412C126}" type="datetimeFigureOut">
               <a:rPr lang="en-US" dirty="0"/>
-              <a:t>8/17/2020</a:t>
+              <a:t>11/20/2020</a:t>
             </a:fld>
             <a:endParaRPr lang="en-US" dirty="0"/>
           </a:p>
@@ -4479,7 +4484,7 @@
           <a:p>
             <a:fld id="{48A87A34-81AB-432B-8DAE-1953F412C126}" type="datetimeFigureOut">
               <a:rPr lang="en-US" dirty="0"/>
-              <a:t>8/17/2020</a:t>
+              <a:t>11/20/2020</a:t>
             </a:fld>
             <a:endParaRPr lang="en-US" dirty="0"/>
           </a:p>
@@ -4741,7 +4746,7 @@
           <a:p>
             <a:fld id="{48A87A34-81AB-432B-8DAE-1953F412C126}" type="datetimeFigureOut">
               <a:rPr lang="en-US" dirty="0"/>
-              <a:t>8/17/2020</a:t>
+              <a:t>11/20/2020</a:t>
             </a:fld>
             <a:endParaRPr lang="en-US" dirty="0"/>
           </a:p>
@@ -5151,7 +5156,7 @@
           <a:p>
             <a:fld id="{48A87A34-81AB-432B-8DAE-1953F412C126}" type="datetimeFigureOut">
               <a:rPr lang="en-US" dirty="0"/>
-              <a:t>8/17/2020</a:t>
+              <a:t>11/20/2020</a:t>
             </a:fld>
             <a:endParaRPr lang="en-US" dirty="0"/>
           </a:p>
@@ -5294,7 +5299,7 @@
           <a:p>
             <a:fld id="{48A87A34-81AB-432B-8DAE-1953F412C126}" type="datetimeFigureOut">
               <a:rPr lang="en-US" dirty="0"/>
-              <a:t>8/17/2020</a:t>
+              <a:t>11/20/2020</a:t>
             </a:fld>
             <a:endParaRPr lang="en-US" dirty="0"/>
           </a:p>
@@ -5414,7 +5419,7 @@
           <a:p>
             <a:fld id="{48A87A34-81AB-432B-8DAE-1953F412C126}" type="datetimeFigureOut">
               <a:rPr lang="en-US" dirty="0"/>
-              <a:t>8/17/2020</a:t>
+              <a:t>11/20/2020</a:t>
             </a:fld>
             <a:endParaRPr lang="en-US" dirty="0"/>
           </a:p>
@@ -5688,7 +5693,7 @@
           <a:p>
             <a:fld id="{48A87A34-81AB-432B-8DAE-1953F412C126}" type="datetimeFigureOut">
               <a:rPr lang="en-US" dirty="0"/>
-              <a:t>8/17/2020</a:t>
+              <a:t>11/20/2020</a:t>
             </a:fld>
             <a:endParaRPr lang="en-US" dirty="0"/>
           </a:p>
@@ -5998,7 +6003,7 @@
           <a:p>
             <a:fld id="{48A87A34-81AB-432B-8DAE-1953F412C126}" type="datetimeFigureOut">
               <a:rPr lang="en-US" dirty="0"/>
-              <a:t>8/17/2020</a:t>
+              <a:t>11/20/2020</a:t>
             </a:fld>
             <a:endParaRPr lang="en-US" dirty="0"/>
           </a:p>
@@ -6247,7 +6252,7 @@
             <a:fld id="{48A87A34-81AB-432B-8DAE-1953F412C126}" type="datetimeFigureOut">
               <a:rPr lang="en-US" dirty="0"/>
               <a:pPr/>
-              <a:t>8/17/2020</a:t>
+              <a:t>11/20/2020</a:t>
             </a:fld>
             <a:endParaRPr lang="en-US" dirty="0"/>
           </a:p>
@@ -6755,7 +6760,7 @@
           <a:p>
             <a:fld id="{5DB5F158-6370-42E4-B64A-D501B501D0E6}" type="datetime1">
               <a:rPr lang="en-US" altLang="zh-TW"/>
-              <a:t>8/17/2020</a:t>
+              <a:t>11/20/2020</a:t>
             </a:fld>
             <a:endParaRPr lang="zh-TW" altLang="en-US" dirty="0"/>
           </a:p>
@@ -12459,31 +12464,2619 @@
           </a:p>
         </p:txBody>
       </p:sp>
-      <p:sp>
-        <p:nvSpPr>
-          <p:cNvPr id="3" name="內容版面配置區 2">
+      <p:grpSp>
+        <p:nvGrpSpPr>
+          <p:cNvPr id="49" name="群組 48">
             <a:extLst>
               <a:ext uri="{FF2B5EF4-FFF2-40B4-BE49-F238E27FC236}">
-                <a16:creationId xmlns:a16="http://schemas.microsoft.com/office/drawing/2014/main" id="{AA109276-959B-4591-8D4B-6BAB4CB3E9CE}"/>
+                <a16:creationId xmlns:a16="http://schemas.microsoft.com/office/drawing/2014/main" id="{9E73BCAD-4FAE-4BFA-8FE1-E8238CB4A10E}"/>
               </a:ext>
             </a:extLst>
           </p:cNvPr>
-          <p:cNvSpPr>
-            <a:spLocks noGrp="1"/>
-          </p:cNvSpPr>
-          <p:nvPr>
-            <p:ph sz="quarter" idx="13"/>
-          </p:nvPr>
+          <p:cNvGrpSpPr/>
+          <p:nvPr/>
+        </p:nvGrpSpPr>
+        <p:grpSpPr>
+          <a:xfrm>
+            <a:off x="3100251" y="2409554"/>
+            <a:ext cx="4180114" cy="3509555"/>
+            <a:chOff x="3100251" y="2409554"/>
+            <a:chExt cx="4180114" cy="3509555"/>
+          </a:xfrm>
+        </p:grpSpPr>
+        <p:sp>
+          <p:nvSpPr>
+            <p:cNvPr id="4" name="矩形 3">
+              <a:extLst>
+                <a:ext uri="{FF2B5EF4-FFF2-40B4-BE49-F238E27FC236}">
+                  <a16:creationId xmlns:a16="http://schemas.microsoft.com/office/drawing/2014/main" id="{F2A70C75-8D52-4E9B-B891-05C938BEDEEC}"/>
+                </a:ext>
+              </a:extLst>
+            </p:cNvPr>
+            <p:cNvSpPr/>
+            <p:nvPr/>
+          </p:nvSpPr>
+          <p:spPr>
+            <a:xfrm>
+              <a:off x="3100251" y="2409554"/>
+              <a:ext cx="4180114" cy="3509555"/>
+            </a:xfrm>
+            <a:prstGeom prst="rect">
+              <a:avLst/>
+            </a:prstGeom>
+          </p:spPr>
+          <p:style>
+            <a:lnRef idx="2">
+              <a:schemeClr val="accent1">
+                <a:shade val="50000"/>
+              </a:schemeClr>
+            </a:lnRef>
+            <a:fillRef idx="1">
+              <a:schemeClr val="accent1"/>
+            </a:fillRef>
+            <a:effectRef idx="0">
+              <a:schemeClr val="accent1"/>
+            </a:effectRef>
+            <a:fontRef idx="minor">
+              <a:schemeClr val="lt1"/>
+            </a:fontRef>
+          </p:style>
+          <p:txBody>
+            <a:bodyPr rtlCol="0" anchor="ctr"/>
+            <a:lstStyle/>
+            <a:p>
+              <a:pPr algn="ctr"/>
+              <a:endParaRPr lang="zh-TW" altLang="en-US"/>
+            </a:p>
+          </p:txBody>
+        </p:sp>
+        <p:sp>
+          <p:nvSpPr>
+            <p:cNvPr id="5" name="橢圓 4">
+              <a:extLst>
+                <a:ext uri="{FF2B5EF4-FFF2-40B4-BE49-F238E27FC236}">
+                  <a16:creationId xmlns:a16="http://schemas.microsoft.com/office/drawing/2014/main" id="{4646C0C4-6F13-4B87-BF53-E67647C4C607}"/>
+                </a:ext>
+              </a:extLst>
+            </p:cNvPr>
+            <p:cNvSpPr/>
+            <p:nvPr/>
+          </p:nvSpPr>
+          <p:spPr>
+            <a:xfrm>
+              <a:off x="4955177" y="3492137"/>
+              <a:ext cx="165463" cy="182880"/>
+            </a:xfrm>
+            <a:prstGeom prst="ellipse">
+              <a:avLst/>
+            </a:prstGeom>
+            <a:solidFill>
+              <a:srgbClr val="FFFF00"/>
+            </a:solidFill>
+          </p:spPr>
+          <p:style>
+            <a:lnRef idx="2">
+              <a:schemeClr val="accent1">
+                <a:shade val="50000"/>
+              </a:schemeClr>
+            </a:lnRef>
+            <a:fillRef idx="1">
+              <a:schemeClr val="accent1"/>
+            </a:fillRef>
+            <a:effectRef idx="0">
+              <a:schemeClr val="accent1"/>
+            </a:effectRef>
+            <a:fontRef idx="minor">
+              <a:schemeClr val="lt1"/>
+            </a:fontRef>
+          </p:style>
+          <p:txBody>
+            <a:bodyPr rtlCol="0" anchor="ctr"/>
+            <a:lstStyle/>
+            <a:p>
+              <a:pPr algn="ctr"/>
+              <a:endParaRPr lang="zh-TW" altLang="en-US"/>
+            </a:p>
+          </p:txBody>
+        </p:sp>
+        <p:sp>
+          <p:nvSpPr>
+            <p:cNvPr id="6" name="橢圓 5">
+              <a:extLst>
+                <a:ext uri="{FF2B5EF4-FFF2-40B4-BE49-F238E27FC236}">
+                  <a16:creationId xmlns:a16="http://schemas.microsoft.com/office/drawing/2014/main" id="{43118A64-B976-4E9B-8D0F-AFC201802244}"/>
+                </a:ext>
+              </a:extLst>
+            </p:cNvPr>
+            <p:cNvSpPr/>
+            <p:nvPr/>
+          </p:nvSpPr>
+          <p:spPr>
+            <a:xfrm>
+              <a:off x="5107577" y="3966756"/>
+              <a:ext cx="165463" cy="182880"/>
+            </a:xfrm>
+            <a:prstGeom prst="ellipse">
+              <a:avLst/>
+            </a:prstGeom>
+            <a:solidFill>
+              <a:srgbClr val="FFFF00"/>
+            </a:solidFill>
+          </p:spPr>
+          <p:style>
+            <a:lnRef idx="2">
+              <a:schemeClr val="accent1">
+                <a:shade val="50000"/>
+              </a:schemeClr>
+            </a:lnRef>
+            <a:fillRef idx="1">
+              <a:schemeClr val="accent1"/>
+            </a:fillRef>
+            <a:effectRef idx="0">
+              <a:schemeClr val="accent1"/>
+            </a:effectRef>
+            <a:fontRef idx="minor">
+              <a:schemeClr val="lt1"/>
+            </a:fontRef>
+          </p:style>
+          <p:txBody>
+            <a:bodyPr rtlCol="0" anchor="ctr"/>
+            <a:lstStyle/>
+            <a:p>
+              <a:pPr algn="ctr"/>
+              <a:endParaRPr lang="zh-TW" altLang="en-US"/>
+            </a:p>
+          </p:txBody>
+        </p:sp>
+        <p:sp>
+          <p:nvSpPr>
+            <p:cNvPr id="7" name="橢圓 6">
+              <a:extLst>
+                <a:ext uri="{FF2B5EF4-FFF2-40B4-BE49-F238E27FC236}">
+                  <a16:creationId xmlns:a16="http://schemas.microsoft.com/office/drawing/2014/main" id="{BEE1802D-E27A-4B36-84CA-53859F5550B0}"/>
+                </a:ext>
+              </a:extLst>
+            </p:cNvPr>
+            <p:cNvSpPr/>
+            <p:nvPr/>
+          </p:nvSpPr>
+          <p:spPr>
+            <a:xfrm>
+              <a:off x="4641668" y="4180116"/>
+              <a:ext cx="165463" cy="182880"/>
+            </a:xfrm>
+            <a:prstGeom prst="ellipse">
+              <a:avLst/>
+            </a:prstGeom>
+            <a:solidFill>
+              <a:srgbClr val="FFFF00"/>
+            </a:solidFill>
+          </p:spPr>
+          <p:style>
+            <a:lnRef idx="2">
+              <a:schemeClr val="accent1">
+                <a:shade val="50000"/>
+              </a:schemeClr>
+            </a:lnRef>
+            <a:fillRef idx="1">
+              <a:schemeClr val="accent1"/>
+            </a:fillRef>
+            <a:effectRef idx="0">
+              <a:schemeClr val="accent1"/>
+            </a:effectRef>
+            <a:fontRef idx="minor">
+              <a:schemeClr val="lt1"/>
+            </a:fontRef>
+          </p:style>
+          <p:txBody>
+            <a:bodyPr rtlCol="0" anchor="ctr"/>
+            <a:lstStyle/>
+            <a:p>
+              <a:pPr algn="ctr"/>
+              <a:endParaRPr lang="zh-TW" altLang="en-US"/>
+            </a:p>
+          </p:txBody>
+        </p:sp>
+        <p:sp>
+          <p:nvSpPr>
+            <p:cNvPr id="8" name="橢圓 7">
+              <a:extLst>
+                <a:ext uri="{FF2B5EF4-FFF2-40B4-BE49-F238E27FC236}">
+                  <a16:creationId xmlns:a16="http://schemas.microsoft.com/office/drawing/2014/main" id="{082E9C5C-485C-40FB-BB28-B6815081FD14}"/>
+                </a:ext>
+              </a:extLst>
+            </p:cNvPr>
+            <p:cNvSpPr/>
+            <p:nvPr/>
+          </p:nvSpPr>
+          <p:spPr>
+            <a:xfrm>
+              <a:off x="4794068" y="4785363"/>
+              <a:ext cx="165463" cy="182880"/>
+            </a:xfrm>
+            <a:prstGeom prst="ellipse">
+              <a:avLst/>
+            </a:prstGeom>
+            <a:solidFill>
+              <a:srgbClr val="FFFF00"/>
+            </a:solidFill>
+          </p:spPr>
+          <p:style>
+            <a:lnRef idx="2">
+              <a:schemeClr val="accent1">
+                <a:shade val="50000"/>
+              </a:schemeClr>
+            </a:lnRef>
+            <a:fillRef idx="1">
+              <a:schemeClr val="accent1"/>
+            </a:fillRef>
+            <a:effectRef idx="0">
+              <a:schemeClr val="accent1"/>
+            </a:effectRef>
+            <a:fontRef idx="minor">
+              <a:schemeClr val="lt1"/>
+            </a:fontRef>
+          </p:style>
+          <p:txBody>
+            <a:bodyPr rtlCol="0" anchor="ctr"/>
+            <a:lstStyle/>
+            <a:p>
+              <a:pPr algn="ctr"/>
+              <a:endParaRPr lang="zh-TW" altLang="en-US"/>
+            </a:p>
+          </p:txBody>
+        </p:sp>
+        <p:sp>
+          <p:nvSpPr>
+            <p:cNvPr id="9" name="橢圓 8">
+              <a:extLst>
+                <a:ext uri="{FF2B5EF4-FFF2-40B4-BE49-F238E27FC236}">
+                  <a16:creationId xmlns:a16="http://schemas.microsoft.com/office/drawing/2014/main" id="{E2511E56-B081-49D1-A01C-65BCAA47B57F}"/>
+                </a:ext>
+              </a:extLst>
+            </p:cNvPr>
+            <p:cNvSpPr/>
+            <p:nvPr/>
+          </p:nvSpPr>
+          <p:spPr>
+            <a:xfrm>
+              <a:off x="5159827" y="3278773"/>
+              <a:ext cx="165463" cy="182880"/>
+            </a:xfrm>
+            <a:prstGeom prst="ellipse">
+              <a:avLst/>
+            </a:prstGeom>
+            <a:solidFill>
+              <a:srgbClr val="FFFF00"/>
+            </a:solidFill>
+          </p:spPr>
+          <p:style>
+            <a:lnRef idx="2">
+              <a:schemeClr val="accent1">
+                <a:shade val="50000"/>
+              </a:schemeClr>
+            </a:lnRef>
+            <a:fillRef idx="1">
+              <a:schemeClr val="accent1"/>
+            </a:fillRef>
+            <a:effectRef idx="0">
+              <a:schemeClr val="accent1"/>
+            </a:effectRef>
+            <a:fontRef idx="minor">
+              <a:schemeClr val="lt1"/>
+            </a:fontRef>
+          </p:style>
+          <p:txBody>
+            <a:bodyPr rtlCol="0" anchor="ctr"/>
+            <a:lstStyle/>
+            <a:p>
+              <a:pPr algn="ctr"/>
+              <a:endParaRPr lang="zh-TW" altLang="en-US"/>
+            </a:p>
+          </p:txBody>
+        </p:sp>
+        <p:sp>
+          <p:nvSpPr>
+            <p:cNvPr id="10" name="橢圓 9">
+              <a:extLst>
+                <a:ext uri="{FF2B5EF4-FFF2-40B4-BE49-F238E27FC236}">
+                  <a16:creationId xmlns:a16="http://schemas.microsoft.com/office/drawing/2014/main" id="{6F919E0F-35D3-488B-BA3E-D31218F3B749}"/>
+                </a:ext>
+              </a:extLst>
+            </p:cNvPr>
+            <p:cNvSpPr/>
+            <p:nvPr/>
+          </p:nvSpPr>
+          <p:spPr>
+            <a:xfrm>
+              <a:off x="5312227" y="3753392"/>
+              <a:ext cx="165463" cy="182880"/>
+            </a:xfrm>
+            <a:prstGeom prst="ellipse">
+              <a:avLst/>
+            </a:prstGeom>
+            <a:solidFill>
+              <a:srgbClr val="FFFF00"/>
+            </a:solidFill>
+          </p:spPr>
+          <p:style>
+            <a:lnRef idx="2">
+              <a:schemeClr val="accent1">
+                <a:shade val="50000"/>
+              </a:schemeClr>
+            </a:lnRef>
+            <a:fillRef idx="1">
+              <a:schemeClr val="accent1"/>
+            </a:fillRef>
+            <a:effectRef idx="0">
+              <a:schemeClr val="accent1"/>
+            </a:effectRef>
+            <a:fontRef idx="minor">
+              <a:schemeClr val="lt1"/>
+            </a:fontRef>
+          </p:style>
+          <p:txBody>
+            <a:bodyPr rtlCol="0" anchor="ctr"/>
+            <a:lstStyle/>
+            <a:p>
+              <a:pPr algn="ctr"/>
+              <a:endParaRPr lang="zh-TW" altLang="en-US"/>
+            </a:p>
+          </p:txBody>
+        </p:sp>
+        <p:sp>
+          <p:nvSpPr>
+            <p:cNvPr id="11" name="橢圓 10">
+              <a:extLst>
+                <a:ext uri="{FF2B5EF4-FFF2-40B4-BE49-F238E27FC236}">
+                  <a16:creationId xmlns:a16="http://schemas.microsoft.com/office/drawing/2014/main" id="{07EF316E-D69B-4A60-8D3D-151D5BD85993}"/>
+                </a:ext>
+              </a:extLst>
+            </p:cNvPr>
+            <p:cNvSpPr/>
+            <p:nvPr/>
+          </p:nvSpPr>
+          <p:spPr>
+            <a:xfrm>
+              <a:off x="4846318" y="3966752"/>
+              <a:ext cx="165463" cy="182880"/>
+            </a:xfrm>
+            <a:prstGeom prst="ellipse">
+              <a:avLst/>
+            </a:prstGeom>
+            <a:solidFill>
+              <a:srgbClr val="FFFF00"/>
+            </a:solidFill>
+          </p:spPr>
+          <p:style>
+            <a:lnRef idx="2">
+              <a:schemeClr val="accent1">
+                <a:shade val="50000"/>
+              </a:schemeClr>
+            </a:lnRef>
+            <a:fillRef idx="1">
+              <a:schemeClr val="accent1"/>
+            </a:fillRef>
+            <a:effectRef idx="0">
+              <a:schemeClr val="accent1"/>
+            </a:effectRef>
+            <a:fontRef idx="minor">
+              <a:schemeClr val="lt1"/>
+            </a:fontRef>
+          </p:style>
+          <p:txBody>
+            <a:bodyPr rtlCol="0" anchor="ctr"/>
+            <a:lstStyle/>
+            <a:p>
+              <a:pPr algn="ctr"/>
+              <a:endParaRPr lang="zh-TW" altLang="en-US"/>
+            </a:p>
+          </p:txBody>
+        </p:sp>
+        <p:sp>
+          <p:nvSpPr>
+            <p:cNvPr id="12" name="橢圓 11">
+              <a:extLst>
+                <a:ext uri="{FF2B5EF4-FFF2-40B4-BE49-F238E27FC236}">
+                  <a16:creationId xmlns:a16="http://schemas.microsoft.com/office/drawing/2014/main" id="{96FFF4B4-F310-4AD0-9E75-0E9DBA37531C}"/>
+                </a:ext>
+              </a:extLst>
+            </p:cNvPr>
+            <p:cNvSpPr/>
+            <p:nvPr/>
+          </p:nvSpPr>
+          <p:spPr>
+            <a:xfrm>
+              <a:off x="4998718" y="4571999"/>
+              <a:ext cx="165463" cy="182880"/>
+            </a:xfrm>
+            <a:prstGeom prst="ellipse">
+              <a:avLst/>
+            </a:prstGeom>
+            <a:solidFill>
+              <a:srgbClr val="FFFF00"/>
+            </a:solidFill>
+            <a:ln>
+              <a:solidFill>
+                <a:srgbClr val="FF0000"/>
+              </a:solidFill>
+            </a:ln>
+          </p:spPr>
+          <p:style>
+            <a:lnRef idx="2">
+              <a:schemeClr val="accent1">
+                <a:shade val="50000"/>
+              </a:schemeClr>
+            </a:lnRef>
+            <a:fillRef idx="1">
+              <a:schemeClr val="accent1"/>
+            </a:fillRef>
+            <a:effectRef idx="0">
+              <a:schemeClr val="accent1"/>
+            </a:effectRef>
+            <a:fontRef idx="minor">
+              <a:schemeClr val="lt1"/>
+            </a:fontRef>
+          </p:style>
+          <p:txBody>
+            <a:bodyPr rtlCol="0" anchor="ctr"/>
+            <a:lstStyle/>
+            <a:p>
+              <a:pPr algn="ctr"/>
+              <a:endParaRPr lang="zh-TW" altLang="en-US"/>
+            </a:p>
+          </p:txBody>
+        </p:sp>
+        <p:sp>
+          <p:nvSpPr>
+            <p:cNvPr id="13" name="橢圓 12">
+              <a:extLst>
+                <a:ext uri="{FF2B5EF4-FFF2-40B4-BE49-F238E27FC236}">
+                  <a16:creationId xmlns:a16="http://schemas.microsoft.com/office/drawing/2014/main" id="{EDC64467-BE28-437E-A16C-C381F1A5880E}"/>
+                </a:ext>
+              </a:extLst>
+            </p:cNvPr>
+            <p:cNvSpPr/>
+            <p:nvPr/>
+          </p:nvSpPr>
+          <p:spPr>
+            <a:xfrm>
+              <a:off x="4160517" y="3361505"/>
+              <a:ext cx="165463" cy="182880"/>
+            </a:xfrm>
+            <a:prstGeom prst="ellipse">
+              <a:avLst/>
+            </a:prstGeom>
+            <a:solidFill>
+              <a:srgbClr val="FFFF00"/>
+            </a:solidFill>
+          </p:spPr>
+          <p:style>
+            <a:lnRef idx="2">
+              <a:schemeClr val="accent1">
+                <a:shade val="50000"/>
+              </a:schemeClr>
+            </a:lnRef>
+            <a:fillRef idx="1">
+              <a:schemeClr val="accent1"/>
+            </a:fillRef>
+            <a:effectRef idx="0">
+              <a:schemeClr val="accent1"/>
+            </a:effectRef>
+            <a:fontRef idx="minor">
+              <a:schemeClr val="lt1"/>
+            </a:fontRef>
+          </p:style>
+          <p:txBody>
+            <a:bodyPr rtlCol="0" anchor="ctr"/>
+            <a:lstStyle/>
+            <a:p>
+              <a:pPr algn="ctr"/>
+              <a:endParaRPr lang="zh-TW" altLang="en-US"/>
+            </a:p>
+          </p:txBody>
+        </p:sp>
+        <p:sp>
+          <p:nvSpPr>
+            <p:cNvPr id="14" name="橢圓 13">
+              <a:extLst>
+                <a:ext uri="{FF2B5EF4-FFF2-40B4-BE49-F238E27FC236}">
+                  <a16:creationId xmlns:a16="http://schemas.microsoft.com/office/drawing/2014/main" id="{70E27D09-840C-4DDA-9D69-5CC845F3D51E}"/>
+                </a:ext>
+              </a:extLst>
+            </p:cNvPr>
+            <p:cNvSpPr/>
+            <p:nvPr/>
+          </p:nvSpPr>
+          <p:spPr>
+            <a:xfrm>
+              <a:off x="4312917" y="3966752"/>
+              <a:ext cx="165463" cy="182880"/>
+            </a:xfrm>
+            <a:prstGeom prst="ellipse">
+              <a:avLst/>
+            </a:prstGeom>
+            <a:solidFill>
+              <a:srgbClr val="FFFF00"/>
+            </a:solidFill>
+          </p:spPr>
+          <p:style>
+            <a:lnRef idx="2">
+              <a:schemeClr val="accent1">
+                <a:shade val="50000"/>
+              </a:schemeClr>
+            </a:lnRef>
+            <a:fillRef idx="1">
+              <a:schemeClr val="accent1"/>
+            </a:fillRef>
+            <a:effectRef idx="0">
+              <a:schemeClr val="accent1"/>
+            </a:effectRef>
+            <a:fontRef idx="minor">
+              <a:schemeClr val="lt1"/>
+            </a:fontRef>
+          </p:style>
+          <p:txBody>
+            <a:bodyPr rtlCol="0" anchor="ctr"/>
+            <a:lstStyle/>
+            <a:p>
+              <a:pPr algn="ctr"/>
+              <a:endParaRPr lang="zh-TW" altLang="en-US"/>
+            </a:p>
+          </p:txBody>
+        </p:sp>
+        <p:sp>
+          <p:nvSpPr>
+            <p:cNvPr id="15" name="橢圓 14">
+              <a:extLst>
+                <a:ext uri="{FF2B5EF4-FFF2-40B4-BE49-F238E27FC236}">
+                  <a16:creationId xmlns:a16="http://schemas.microsoft.com/office/drawing/2014/main" id="{D770ABE6-FE09-4719-9242-016BDD04025A}"/>
+                </a:ext>
+              </a:extLst>
+            </p:cNvPr>
+            <p:cNvSpPr/>
+            <p:nvPr/>
+          </p:nvSpPr>
+          <p:spPr>
+            <a:xfrm>
+              <a:off x="4380410" y="3768632"/>
+              <a:ext cx="165463" cy="182880"/>
+            </a:xfrm>
+            <a:prstGeom prst="ellipse">
+              <a:avLst/>
+            </a:prstGeom>
+            <a:solidFill>
+              <a:srgbClr val="FFFF00"/>
+            </a:solidFill>
+          </p:spPr>
+          <p:style>
+            <a:lnRef idx="2">
+              <a:schemeClr val="accent1">
+                <a:shade val="50000"/>
+              </a:schemeClr>
+            </a:lnRef>
+            <a:fillRef idx="1">
+              <a:schemeClr val="accent1"/>
+            </a:fillRef>
+            <a:effectRef idx="0">
+              <a:schemeClr val="accent1"/>
+            </a:effectRef>
+            <a:fontRef idx="minor">
+              <a:schemeClr val="lt1"/>
+            </a:fontRef>
+          </p:style>
+          <p:txBody>
+            <a:bodyPr rtlCol="0" anchor="ctr"/>
+            <a:lstStyle/>
+            <a:p>
+              <a:pPr algn="ctr"/>
+              <a:endParaRPr lang="zh-TW" altLang="en-US"/>
+            </a:p>
+          </p:txBody>
+        </p:sp>
+        <p:sp>
+          <p:nvSpPr>
+            <p:cNvPr id="16" name="橢圓 15">
+              <a:extLst>
+                <a:ext uri="{FF2B5EF4-FFF2-40B4-BE49-F238E27FC236}">
+                  <a16:creationId xmlns:a16="http://schemas.microsoft.com/office/drawing/2014/main" id="{AE3C5CC7-5AC9-4A90-9EAA-DE326C1E8A10}"/>
+                </a:ext>
+              </a:extLst>
+            </p:cNvPr>
+            <p:cNvSpPr/>
+            <p:nvPr/>
+          </p:nvSpPr>
+          <p:spPr>
+            <a:xfrm>
+              <a:off x="3983081" y="3936268"/>
+              <a:ext cx="165463" cy="182880"/>
+            </a:xfrm>
+            <a:prstGeom prst="ellipse">
+              <a:avLst/>
+            </a:prstGeom>
+            <a:solidFill>
+              <a:srgbClr val="FFFF00"/>
+            </a:solidFill>
+          </p:spPr>
+          <p:style>
+            <a:lnRef idx="2">
+              <a:schemeClr val="accent1">
+                <a:shade val="50000"/>
+              </a:schemeClr>
+            </a:lnRef>
+            <a:fillRef idx="1">
+              <a:schemeClr val="accent1"/>
+            </a:fillRef>
+            <a:effectRef idx="0">
+              <a:schemeClr val="accent1"/>
+            </a:effectRef>
+            <a:fontRef idx="minor">
+              <a:schemeClr val="lt1"/>
+            </a:fontRef>
+          </p:style>
+          <p:txBody>
+            <a:bodyPr rtlCol="0" anchor="ctr"/>
+            <a:lstStyle/>
+            <a:p>
+              <a:pPr algn="ctr"/>
+              <a:endParaRPr lang="zh-TW" altLang="en-US"/>
+            </a:p>
+          </p:txBody>
+        </p:sp>
+        <p:sp>
+          <p:nvSpPr>
+            <p:cNvPr id="17" name="橢圓 16">
+              <a:extLst>
+                <a:ext uri="{FF2B5EF4-FFF2-40B4-BE49-F238E27FC236}">
+                  <a16:creationId xmlns:a16="http://schemas.microsoft.com/office/drawing/2014/main" id="{4D0E6CEE-D22F-47F6-AD94-662865B7C38D}"/>
+                </a:ext>
+              </a:extLst>
+            </p:cNvPr>
+            <p:cNvSpPr/>
+            <p:nvPr/>
+          </p:nvSpPr>
+          <p:spPr>
+            <a:xfrm>
+              <a:off x="4135481" y="4541515"/>
+              <a:ext cx="165463" cy="182880"/>
+            </a:xfrm>
+            <a:prstGeom prst="ellipse">
+              <a:avLst/>
+            </a:prstGeom>
+            <a:solidFill>
+              <a:srgbClr val="FFFF00"/>
+            </a:solidFill>
+          </p:spPr>
+          <p:style>
+            <a:lnRef idx="2">
+              <a:schemeClr val="accent1">
+                <a:shade val="50000"/>
+              </a:schemeClr>
+            </a:lnRef>
+            <a:fillRef idx="1">
+              <a:schemeClr val="accent1"/>
+            </a:fillRef>
+            <a:effectRef idx="0">
+              <a:schemeClr val="accent1"/>
+            </a:effectRef>
+            <a:fontRef idx="minor">
+              <a:schemeClr val="lt1"/>
+            </a:fontRef>
+          </p:style>
+          <p:txBody>
+            <a:bodyPr rtlCol="0" anchor="ctr"/>
+            <a:lstStyle/>
+            <a:p>
+              <a:pPr algn="ctr"/>
+              <a:endParaRPr lang="zh-TW" altLang="en-US"/>
+            </a:p>
+          </p:txBody>
+        </p:sp>
+        <p:sp>
+          <p:nvSpPr>
+            <p:cNvPr id="18" name="橢圓 17">
+              <a:extLst>
+                <a:ext uri="{FF2B5EF4-FFF2-40B4-BE49-F238E27FC236}">
+                  <a16:creationId xmlns:a16="http://schemas.microsoft.com/office/drawing/2014/main" id="{71204BCA-93B9-4455-8672-10DFC3001146}"/>
+                </a:ext>
+              </a:extLst>
+            </p:cNvPr>
+            <p:cNvSpPr/>
+            <p:nvPr/>
+          </p:nvSpPr>
+          <p:spPr>
+            <a:xfrm>
+              <a:off x="4340131" y="4328151"/>
+              <a:ext cx="165463" cy="182880"/>
+            </a:xfrm>
+            <a:prstGeom prst="ellipse">
+              <a:avLst/>
+            </a:prstGeom>
+            <a:solidFill>
+              <a:srgbClr val="FFFF00"/>
+            </a:solidFill>
+          </p:spPr>
+          <p:style>
+            <a:lnRef idx="2">
+              <a:schemeClr val="accent1">
+                <a:shade val="50000"/>
+              </a:schemeClr>
+            </a:lnRef>
+            <a:fillRef idx="1">
+              <a:schemeClr val="accent1"/>
+            </a:fillRef>
+            <a:effectRef idx="0">
+              <a:schemeClr val="accent1"/>
+            </a:effectRef>
+            <a:fontRef idx="minor">
+              <a:schemeClr val="lt1"/>
+            </a:fontRef>
+          </p:style>
+          <p:txBody>
+            <a:bodyPr rtlCol="0" anchor="ctr"/>
+            <a:lstStyle/>
+            <a:p>
+              <a:pPr algn="ctr"/>
+              <a:endParaRPr lang="zh-TW" altLang="en-US"/>
+            </a:p>
+          </p:txBody>
+        </p:sp>
+        <p:sp>
+          <p:nvSpPr>
+            <p:cNvPr id="19" name="橢圓 18">
+              <a:extLst>
+                <a:ext uri="{FF2B5EF4-FFF2-40B4-BE49-F238E27FC236}">
+                  <a16:creationId xmlns:a16="http://schemas.microsoft.com/office/drawing/2014/main" id="{BE584B27-6DB6-4C06-A798-CA67550FF305}"/>
+                </a:ext>
+              </a:extLst>
+            </p:cNvPr>
+            <p:cNvSpPr/>
+            <p:nvPr/>
+          </p:nvSpPr>
+          <p:spPr>
+            <a:xfrm>
+              <a:off x="5107577" y="3644537"/>
+              <a:ext cx="165463" cy="182880"/>
+            </a:xfrm>
+            <a:prstGeom prst="ellipse">
+              <a:avLst/>
+            </a:prstGeom>
+            <a:solidFill>
+              <a:srgbClr val="FFFF00"/>
+            </a:solidFill>
+          </p:spPr>
+          <p:style>
+            <a:lnRef idx="2">
+              <a:schemeClr val="accent1">
+                <a:shade val="50000"/>
+              </a:schemeClr>
+            </a:lnRef>
+            <a:fillRef idx="1">
+              <a:schemeClr val="accent1"/>
+            </a:fillRef>
+            <a:effectRef idx="0">
+              <a:schemeClr val="accent1"/>
+            </a:effectRef>
+            <a:fontRef idx="minor">
+              <a:schemeClr val="lt1"/>
+            </a:fontRef>
+          </p:style>
+          <p:txBody>
+            <a:bodyPr rtlCol="0" anchor="ctr"/>
+            <a:lstStyle/>
+            <a:p>
+              <a:pPr algn="ctr"/>
+              <a:endParaRPr lang="zh-TW" altLang="en-US"/>
+            </a:p>
+          </p:txBody>
+        </p:sp>
+        <p:sp>
+          <p:nvSpPr>
+            <p:cNvPr id="20" name="橢圓 19">
+              <a:extLst>
+                <a:ext uri="{FF2B5EF4-FFF2-40B4-BE49-F238E27FC236}">
+                  <a16:creationId xmlns:a16="http://schemas.microsoft.com/office/drawing/2014/main" id="{737B5F09-1A98-4D46-8F87-05C1D92AD2C3}"/>
+                </a:ext>
+              </a:extLst>
+            </p:cNvPr>
+            <p:cNvSpPr/>
+            <p:nvPr/>
+          </p:nvSpPr>
+          <p:spPr>
+            <a:xfrm>
+              <a:off x="5259977" y="4119156"/>
+              <a:ext cx="165463" cy="182880"/>
+            </a:xfrm>
+            <a:prstGeom prst="ellipse">
+              <a:avLst/>
+            </a:prstGeom>
+            <a:solidFill>
+              <a:srgbClr val="FFFF00"/>
+            </a:solidFill>
+            <a:ln>
+              <a:solidFill>
+                <a:srgbClr val="FF0000"/>
+              </a:solidFill>
+            </a:ln>
+          </p:spPr>
+          <p:style>
+            <a:lnRef idx="2">
+              <a:schemeClr val="accent1">
+                <a:shade val="50000"/>
+              </a:schemeClr>
+            </a:lnRef>
+            <a:fillRef idx="1">
+              <a:schemeClr val="accent1"/>
+            </a:fillRef>
+            <a:effectRef idx="0">
+              <a:schemeClr val="accent1"/>
+            </a:effectRef>
+            <a:fontRef idx="minor">
+              <a:schemeClr val="lt1"/>
+            </a:fontRef>
+          </p:style>
+          <p:txBody>
+            <a:bodyPr rtlCol="0" anchor="ctr"/>
+            <a:lstStyle/>
+            <a:p>
+              <a:pPr algn="ctr"/>
+              <a:endParaRPr lang="zh-TW" altLang="en-US"/>
+            </a:p>
+          </p:txBody>
+        </p:sp>
+        <p:sp>
+          <p:nvSpPr>
+            <p:cNvPr id="21" name="橢圓 20">
+              <a:extLst>
+                <a:ext uri="{FF2B5EF4-FFF2-40B4-BE49-F238E27FC236}">
+                  <a16:creationId xmlns:a16="http://schemas.microsoft.com/office/drawing/2014/main" id="{98C617EB-C6CF-469C-9E5F-F28C1C0761CC}"/>
+                </a:ext>
+              </a:extLst>
+            </p:cNvPr>
+            <p:cNvSpPr/>
+            <p:nvPr/>
+          </p:nvSpPr>
+          <p:spPr>
+            <a:xfrm>
+              <a:off x="4794068" y="4332516"/>
+              <a:ext cx="165463" cy="182880"/>
+            </a:xfrm>
+            <a:prstGeom prst="ellipse">
+              <a:avLst/>
+            </a:prstGeom>
+            <a:solidFill>
+              <a:srgbClr val="FFFF00"/>
+            </a:solidFill>
+          </p:spPr>
+          <p:style>
+            <a:lnRef idx="2">
+              <a:schemeClr val="accent1">
+                <a:shade val="50000"/>
+              </a:schemeClr>
+            </a:lnRef>
+            <a:fillRef idx="1">
+              <a:schemeClr val="accent1"/>
+            </a:fillRef>
+            <a:effectRef idx="0">
+              <a:schemeClr val="accent1"/>
+            </a:effectRef>
+            <a:fontRef idx="minor">
+              <a:schemeClr val="lt1"/>
+            </a:fontRef>
+          </p:style>
+          <p:txBody>
+            <a:bodyPr rtlCol="0" anchor="ctr"/>
+            <a:lstStyle/>
+            <a:p>
+              <a:pPr algn="ctr"/>
+              <a:endParaRPr lang="zh-TW" altLang="en-US"/>
+            </a:p>
+          </p:txBody>
+        </p:sp>
+        <p:sp>
+          <p:nvSpPr>
+            <p:cNvPr id="22" name="橢圓 21">
+              <a:extLst>
+                <a:ext uri="{FF2B5EF4-FFF2-40B4-BE49-F238E27FC236}">
+                  <a16:creationId xmlns:a16="http://schemas.microsoft.com/office/drawing/2014/main" id="{7535FDD5-2A95-41A5-8F1D-BA6888F6998E}"/>
+                </a:ext>
+              </a:extLst>
+            </p:cNvPr>
+            <p:cNvSpPr/>
+            <p:nvPr/>
+          </p:nvSpPr>
+          <p:spPr>
+            <a:xfrm>
+              <a:off x="4946468" y="4937763"/>
+              <a:ext cx="165463" cy="182880"/>
+            </a:xfrm>
+            <a:prstGeom prst="ellipse">
+              <a:avLst/>
+            </a:prstGeom>
+            <a:solidFill>
+              <a:srgbClr val="FFFF00"/>
+            </a:solidFill>
+            <a:ln>
+              <a:solidFill>
+                <a:srgbClr val="FF0000"/>
+              </a:solidFill>
+            </a:ln>
+          </p:spPr>
+          <p:style>
+            <a:lnRef idx="2">
+              <a:schemeClr val="accent1">
+                <a:shade val="50000"/>
+              </a:schemeClr>
+            </a:lnRef>
+            <a:fillRef idx="1">
+              <a:schemeClr val="accent1"/>
+            </a:fillRef>
+            <a:effectRef idx="0">
+              <a:schemeClr val="accent1"/>
+            </a:effectRef>
+            <a:fontRef idx="minor">
+              <a:schemeClr val="lt1"/>
+            </a:fontRef>
+          </p:style>
+          <p:txBody>
+            <a:bodyPr rtlCol="0" anchor="ctr"/>
+            <a:lstStyle/>
+            <a:p>
+              <a:pPr algn="ctr"/>
+              <a:endParaRPr lang="zh-TW" altLang="en-US"/>
+            </a:p>
+          </p:txBody>
+        </p:sp>
+        <p:sp>
+          <p:nvSpPr>
+            <p:cNvPr id="23" name="橢圓 22">
+              <a:extLst>
+                <a:ext uri="{FF2B5EF4-FFF2-40B4-BE49-F238E27FC236}">
+                  <a16:creationId xmlns:a16="http://schemas.microsoft.com/office/drawing/2014/main" id="{40B74156-05B3-42C8-9E42-07EAB2B19F1C}"/>
+                </a:ext>
+              </a:extLst>
+            </p:cNvPr>
+            <p:cNvSpPr/>
+            <p:nvPr/>
+          </p:nvSpPr>
+          <p:spPr>
+            <a:xfrm>
+              <a:off x="5312227" y="3431173"/>
+              <a:ext cx="165463" cy="182880"/>
+            </a:xfrm>
+            <a:prstGeom prst="ellipse">
+              <a:avLst/>
+            </a:prstGeom>
+            <a:solidFill>
+              <a:srgbClr val="FFFF00"/>
+            </a:solidFill>
+          </p:spPr>
+          <p:style>
+            <a:lnRef idx="2">
+              <a:schemeClr val="accent1">
+                <a:shade val="50000"/>
+              </a:schemeClr>
+            </a:lnRef>
+            <a:fillRef idx="1">
+              <a:schemeClr val="accent1"/>
+            </a:fillRef>
+            <a:effectRef idx="0">
+              <a:schemeClr val="accent1"/>
+            </a:effectRef>
+            <a:fontRef idx="minor">
+              <a:schemeClr val="lt1"/>
+            </a:fontRef>
+          </p:style>
+          <p:txBody>
+            <a:bodyPr rtlCol="0" anchor="ctr"/>
+            <a:lstStyle/>
+            <a:p>
+              <a:pPr algn="ctr"/>
+              <a:endParaRPr lang="zh-TW" altLang="en-US"/>
+            </a:p>
+          </p:txBody>
+        </p:sp>
+        <p:sp>
+          <p:nvSpPr>
+            <p:cNvPr id="24" name="橢圓 23">
+              <a:extLst>
+                <a:ext uri="{FF2B5EF4-FFF2-40B4-BE49-F238E27FC236}">
+                  <a16:creationId xmlns:a16="http://schemas.microsoft.com/office/drawing/2014/main" id="{0B643598-9443-4CBF-B2A9-A55A115C781F}"/>
+                </a:ext>
+              </a:extLst>
+            </p:cNvPr>
+            <p:cNvSpPr/>
+            <p:nvPr/>
+          </p:nvSpPr>
+          <p:spPr>
+            <a:xfrm>
+              <a:off x="5464627" y="3905792"/>
+              <a:ext cx="165463" cy="182880"/>
+            </a:xfrm>
+            <a:prstGeom prst="ellipse">
+              <a:avLst/>
+            </a:prstGeom>
+            <a:solidFill>
+              <a:srgbClr val="FFFF00"/>
+            </a:solidFill>
+            <a:ln>
+              <a:solidFill>
+                <a:srgbClr val="FF0000"/>
+              </a:solidFill>
+            </a:ln>
+          </p:spPr>
+          <p:style>
+            <a:lnRef idx="2">
+              <a:schemeClr val="accent1">
+                <a:shade val="50000"/>
+              </a:schemeClr>
+            </a:lnRef>
+            <a:fillRef idx="1">
+              <a:schemeClr val="accent1"/>
+            </a:fillRef>
+            <a:effectRef idx="0">
+              <a:schemeClr val="accent1"/>
+            </a:effectRef>
+            <a:fontRef idx="minor">
+              <a:schemeClr val="lt1"/>
+            </a:fontRef>
+          </p:style>
+          <p:txBody>
+            <a:bodyPr rtlCol="0" anchor="ctr"/>
+            <a:lstStyle/>
+            <a:p>
+              <a:pPr algn="ctr"/>
+              <a:endParaRPr lang="zh-TW" altLang="en-US"/>
+            </a:p>
+          </p:txBody>
+        </p:sp>
+        <p:sp>
+          <p:nvSpPr>
+            <p:cNvPr id="25" name="橢圓 24">
+              <a:extLst>
+                <a:ext uri="{FF2B5EF4-FFF2-40B4-BE49-F238E27FC236}">
+                  <a16:creationId xmlns:a16="http://schemas.microsoft.com/office/drawing/2014/main" id="{7337D278-BFF4-4953-B98C-FDD7CC05B378}"/>
+                </a:ext>
+              </a:extLst>
+            </p:cNvPr>
+            <p:cNvSpPr/>
+            <p:nvPr/>
+          </p:nvSpPr>
+          <p:spPr>
+            <a:xfrm>
+              <a:off x="4998718" y="4119152"/>
+              <a:ext cx="165463" cy="182880"/>
+            </a:xfrm>
+            <a:prstGeom prst="ellipse">
+              <a:avLst/>
+            </a:prstGeom>
+            <a:solidFill>
+              <a:srgbClr val="FFFF00"/>
+            </a:solidFill>
+          </p:spPr>
+          <p:style>
+            <a:lnRef idx="2">
+              <a:schemeClr val="accent1">
+                <a:shade val="50000"/>
+              </a:schemeClr>
+            </a:lnRef>
+            <a:fillRef idx="1">
+              <a:schemeClr val="accent1"/>
+            </a:fillRef>
+            <a:effectRef idx="0">
+              <a:schemeClr val="accent1"/>
+            </a:effectRef>
+            <a:fontRef idx="minor">
+              <a:schemeClr val="lt1"/>
+            </a:fontRef>
+          </p:style>
+          <p:txBody>
+            <a:bodyPr rtlCol="0" anchor="ctr"/>
+            <a:lstStyle/>
+            <a:p>
+              <a:pPr algn="ctr"/>
+              <a:endParaRPr lang="zh-TW" altLang="en-US"/>
+            </a:p>
+          </p:txBody>
+        </p:sp>
+        <p:sp>
+          <p:nvSpPr>
+            <p:cNvPr id="26" name="橢圓 25">
+              <a:extLst>
+                <a:ext uri="{FF2B5EF4-FFF2-40B4-BE49-F238E27FC236}">
+                  <a16:creationId xmlns:a16="http://schemas.microsoft.com/office/drawing/2014/main" id="{2468AE9C-ADF1-48AA-B633-8873CDB4CD5C}"/>
+                </a:ext>
+              </a:extLst>
+            </p:cNvPr>
+            <p:cNvSpPr/>
+            <p:nvPr/>
+          </p:nvSpPr>
+          <p:spPr>
+            <a:xfrm>
+              <a:off x="5151118" y="4724399"/>
+              <a:ext cx="165463" cy="182880"/>
+            </a:xfrm>
+            <a:prstGeom prst="ellipse">
+              <a:avLst/>
+            </a:prstGeom>
+            <a:solidFill>
+              <a:srgbClr val="FFFF00"/>
+            </a:solidFill>
+          </p:spPr>
+          <p:style>
+            <a:lnRef idx="2">
+              <a:schemeClr val="accent1">
+                <a:shade val="50000"/>
+              </a:schemeClr>
+            </a:lnRef>
+            <a:fillRef idx="1">
+              <a:schemeClr val="accent1"/>
+            </a:fillRef>
+            <a:effectRef idx="0">
+              <a:schemeClr val="accent1"/>
+            </a:effectRef>
+            <a:fontRef idx="minor">
+              <a:schemeClr val="lt1"/>
+            </a:fontRef>
+          </p:style>
+          <p:txBody>
+            <a:bodyPr rtlCol="0" anchor="ctr"/>
+            <a:lstStyle/>
+            <a:p>
+              <a:pPr algn="ctr"/>
+              <a:endParaRPr lang="zh-TW" altLang="en-US"/>
+            </a:p>
+          </p:txBody>
+        </p:sp>
+        <p:sp>
+          <p:nvSpPr>
+            <p:cNvPr id="27" name="橢圓 26">
+              <a:extLst>
+                <a:ext uri="{FF2B5EF4-FFF2-40B4-BE49-F238E27FC236}">
+                  <a16:creationId xmlns:a16="http://schemas.microsoft.com/office/drawing/2014/main" id="{C67BF59A-B14E-4D0E-8B9F-1BD0ADF2508C}"/>
+                </a:ext>
+              </a:extLst>
+            </p:cNvPr>
+            <p:cNvSpPr/>
+            <p:nvPr/>
+          </p:nvSpPr>
+          <p:spPr>
+            <a:xfrm>
+              <a:off x="4312917" y="3513905"/>
+              <a:ext cx="165463" cy="182880"/>
+            </a:xfrm>
+            <a:prstGeom prst="ellipse">
+              <a:avLst/>
+            </a:prstGeom>
+            <a:solidFill>
+              <a:srgbClr val="FFFF00"/>
+            </a:solidFill>
+          </p:spPr>
+          <p:style>
+            <a:lnRef idx="2">
+              <a:schemeClr val="accent1">
+                <a:shade val="50000"/>
+              </a:schemeClr>
+            </a:lnRef>
+            <a:fillRef idx="1">
+              <a:schemeClr val="accent1"/>
+            </a:fillRef>
+            <a:effectRef idx="0">
+              <a:schemeClr val="accent1"/>
+            </a:effectRef>
+            <a:fontRef idx="minor">
+              <a:schemeClr val="lt1"/>
+            </a:fontRef>
+          </p:style>
+          <p:txBody>
+            <a:bodyPr rtlCol="0" anchor="ctr"/>
+            <a:lstStyle/>
+            <a:p>
+              <a:pPr algn="ctr"/>
+              <a:endParaRPr lang="zh-TW" altLang="en-US"/>
+            </a:p>
+          </p:txBody>
+        </p:sp>
+        <p:sp>
+          <p:nvSpPr>
+            <p:cNvPr id="28" name="橢圓 27">
+              <a:extLst>
+                <a:ext uri="{FF2B5EF4-FFF2-40B4-BE49-F238E27FC236}">
+                  <a16:creationId xmlns:a16="http://schemas.microsoft.com/office/drawing/2014/main" id="{BF81A5EF-DE41-4D16-AA5C-9BD267F6AC39}"/>
+                </a:ext>
+              </a:extLst>
+            </p:cNvPr>
+            <p:cNvSpPr/>
+            <p:nvPr/>
+          </p:nvSpPr>
+          <p:spPr>
+            <a:xfrm>
+              <a:off x="4465317" y="4119152"/>
+              <a:ext cx="165463" cy="182880"/>
+            </a:xfrm>
+            <a:prstGeom prst="ellipse">
+              <a:avLst/>
+            </a:prstGeom>
+            <a:solidFill>
+              <a:srgbClr val="FFFF00"/>
+            </a:solidFill>
+          </p:spPr>
+          <p:style>
+            <a:lnRef idx="2">
+              <a:schemeClr val="accent1">
+                <a:shade val="50000"/>
+              </a:schemeClr>
+            </a:lnRef>
+            <a:fillRef idx="1">
+              <a:schemeClr val="accent1"/>
+            </a:fillRef>
+            <a:effectRef idx="0">
+              <a:schemeClr val="accent1"/>
+            </a:effectRef>
+            <a:fontRef idx="minor">
+              <a:schemeClr val="lt1"/>
+            </a:fontRef>
+          </p:style>
+          <p:txBody>
+            <a:bodyPr rtlCol="0" anchor="ctr"/>
+            <a:lstStyle/>
+            <a:p>
+              <a:pPr algn="ctr"/>
+              <a:endParaRPr lang="zh-TW" altLang="en-US"/>
+            </a:p>
+          </p:txBody>
+        </p:sp>
+        <p:sp>
+          <p:nvSpPr>
+            <p:cNvPr id="29" name="橢圓 28">
+              <a:extLst>
+                <a:ext uri="{FF2B5EF4-FFF2-40B4-BE49-F238E27FC236}">
+                  <a16:creationId xmlns:a16="http://schemas.microsoft.com/office/drawing/2014/main" id="{138833DB-50F9-41E8-A6EE-12BBFB67EA6A}"/>
+                </a:ext>
+              </a:extLst>
+            </p:cNvPr>
+            <p:cNvSpPr/>
+            <p:nvPr/>
+          </p:nvSpPr>
+          <p:spPr>
+            <a:xfrm>
+              <a:off x="4669967" y="3905788"/>
+              <a:ext cx="165463" cy="182880"/>
+            </a:xfrm>
+            <a:prstGeom prst="ellipse">
+              <a:avLst/>
+            </a:prstGeom>
+            <a:solidFill>
+              <a:srgbClr val="FFFF00"/>
+            </a:solidFill>
+          </p:spPr>
+          <p:style>
+            <a:lnRef idx="2">
+              <a:schemeClr val="accent1">
+                <a:shade val="50000"/>
+              </a:schemeClr>
+            </a:lnRef>
+            <a:fillRef idx="1">
+              <a:schemeClr val="accent1"/>
+            </a:fillRef>
+            <a:effectRef idx="0">
+              <a:schemeClr val="accent1"/>
+            </a:effectRef>
+            <a:fontRef idx="minor">
+              <a:schemeClr val="lt1"/>
+            </a:fontRef>
+          </p:style>
+          <p:txBody>
+            <a:bodyPr rtlCol="0" anchor="ctr"/>
+            <a:lstStyle/>
+            <a:p>
+              <a:pPr algn="ctr"/>
+              <a:endParaRPr lang="zh-TW" altLang="en-US"/>
+            </a:p>
+          </p:txBody>
+        </p:sp>
+        <p:sp>
+          <p:nvSpPr>
+            <p:cNvPr id="30" name="橢圓 29">
+              <a:extLst>
+                <a:ext uri="{FF2B5EF4-FFF2-40B4-BE49-F238E27FC236}">
+                  <a16:creationId xmlns:a16="http://schemas.microsoft.com/office/drawing/2014/main" id="{2E49B3C7-952E-4895-97AB-AD21AC81E67F}"/>
+                </a:ext>
+              </a:extLst>
+            </p:cNvPr>
+            <p:cNvSpPr/>
+            <p:nvPr/>
+          </p:nvSpPr>
+          <p:spPr>
+            <a:xfrm>
+              <a:off x="4135481" y="4088668"/>
+              <a:ext cx="165463" cy="182880"/>
+            </a:xfrm>
+            <a:prstGeom prst="ellipse">
+              <a:avLst/>
+            </a:prstGeom>
+            <a:solidFill>
+              <a:srgbClr val="FFFF00"/>
+            </a:solidFill>
+          </p:spPr>
+          <p:style>
+            <a:lnRef idx="2">
+              <a:schemeClr val="accent1">
+                <a:shade val="50000"/>
+              </a:schemeClr>
+            </a:lnRef>
+            <a:fillRef idx="1">
+              <a:schemeClr val="accent1"/>
+            </a:fillRef>
+            <a:effectRef idx="0">
+              <a:schemeClr val="accent1"/>
+            </a:effectRef>
+            <a:fontRef idx="minor">
+              <a:schemeClr val="lt1"/>
+            </a:fontRef>
+          </p:style>
+          <p:txBody>
+            <a:bodyPr rtlCol="0" anchor="ctr"/>
+            <a:lstStyle/>
+            <a:p>
+              <a:pPr algn="ctr"/>
+              <a:endParaRPr lang="zh-TW" altLang="en-US"/>
+            </a:p>
+          </p:txBody>
+        </p:sp>
+        <p:sp>
+          <p:nvSpPr>
+            <p:cNvPr id="31" name="橢圓 30">
+              <a:extLst>
+                <a:ext uri="{FF2B5EF4-FFF2-40B4-BE49-F238E27FC236}">
+                  <a16:creationId xmlns:a16="http://schemas.microsoft.com/office/drawing/2014/main" id="{F8B45481-5070-4D0E-8486-EDF62D99674A}"/>
+                </a:ext>
+              </a:extLst>
+            </p:cNvPr>
+            <p:cNvSpPr/>
+            <p:nvPr/>
+          </p:nvSpPr>
+          <p:spPr>
+            <a:xfrm>
+              <a:off x="4287881" y="4693915"/>
+              <a:ext cx="165463" cy="182880"/>
+            </a:xfrm>
+            <a:prstGeom prst="ellipse">
+              <a:avLst/>
+            </a:prstGeom>
+            <a:solidFill>
+              <a:srgbClr val="FFFF00"/>
+            </a:solidFill>
+          </p:spPr>
+          <p:style>
+            <a:lnRef idx="2">
+              <a:schemeClr val="accent1">
+                <a:shade val="50000"/>
+              </a:schemeClr>
+            </a:lnRef>
+            <a:fillRef idx="1">
+              <a:schemeClr val="accent1"/>
+            </a:fillRef>
+            <a:effectRef idx="0">
+              <a:schemeClr val="accent1"/>
+            </a:effectRef>
+            <a:fontRef idx="minor">
+              <a:schemeClr val="lt1"/>
+            </a:fontRef>
+          </p:style>
+          <p:txBody>
+            <a:bodyPr rtlCol="0" anchor="ctr"/>
+            <a:lstStyle/>
+            <a:p>
+              <a:pPr algn="ctr"/>
+              <a:endParaRPr lang="zh-TW" altLang="en-US"/>
+            </a:p>
+          </p:txBody>
+        </p:sp>
+        <p:sp>
+          <p:nvSpPr>
+            <p:cNvPr id="32" name="橢圓 31">
+              <a:extLst>
+                <a:ext uri="{FF2B5EF4-FFF2-40B4-BE49-F238E27FC236}">
+                  <a16:creationId xmlns:a16="http://schemas.microsoft.com/office/drawing/2014/main" id="{F5586DE0-B1A8-469F-AFA5-2679E132F8E3}"/>
+                </a:ext>
+              </a:extLst>
+            </p:cNvPr>
+            <p:cNvSpPr/>
+            <p:nvPr/>
+          </p:nvSpPr>
+          <p:spPr>
+            <a:xfrm>
+              <a:off x="4492531" y="4480551"/>
+              <a:ext cx="165463" cy="182880"/>
+            </a:xfrm>
+            <a:prstGeom prst="ellipse">
+              <a:avLst/>
+            </a:prstGeom>
+            <a:solidFill>
+              <a:srgbClr val="FFFF00"/>
+            </a:solidFill>
+          </p:spPr>
+          <p:style>
+            <a:lnRef idx="2">
+              <a:schemeClr val="accent1">
+                <a:shade val="50000"/>
+              </a:schemeClr>
+            </a:lnRef>
+            <a:fillRef idx="1">
+              <a:schemeClr val="accent1"/>
+            </a:fillRef>
+            <a:effectRef idx="0">
+              <a:schemeClr val="accent1"/>
+            </a:effectRef>
+            <a:fontRef idx="minor">
+              <a:schemeClr val="lt1"/>
+            </a:fontRef>
+          </p:style>
+          <p:txBody>
+            <a:bodyPr rtlCol="0" anchor="ctr"/>
+            <a:lstStyle/>
+            <a:p>
+              <a:pPr algn="ctr"/>
+              <a:endParaRPr lang="zh-TW" altLang="en-US"/>
+            </a:p>
+          </p:txBody>
+        </p:sp>
+        <p:sp>
+          <p:nvSpPr>
+            <p:cNvPr id="33" name="橢圓 32">
+              <a:extLst>
+                <a:ext uri="{FF2B5EF4-FFF2-40B4-BE49-F238E27FC236}">
+                  <a16:creationId xmlns:a16="http://schemas.microsoft.com/office/drawing/2014/main" id="{3BCACFBE-AA04-47B7-97F9-F0BD42ABBC37}"/>
+                </a:ext>
+              </a:extLst>
+            </p:cNvPr>
+            <p:cNvSpPr/>
+            <p:nvPr/>
+          </p:nvSpPr>
+          <p:spPr>
+            <a:xfrm>
+              <a:off x="5736770" y="3829052"/>
+              <a:ext cx="165463" cy="182880"/>
+            </a:xfrm>
+            <a:prstGeom prst="ellipse">
+              <a:avLst/>
+            </a:prstGeom>
+            <a:solidFill>
+              <a:srgbClr val="92D050"/>
+            </a:solidFill>
+            <a:ln>
+              <a:solidFill>
+                <a:srgbClr val="FF0000"/>
+              </a:solidFill>
+            </a:ln>
+          </p:spPr>
+          <p:style>
+            <a:lnRef idx="2">
+              <a:schemeClr val="accent1">
+                <a:shade val="50000"/>
+              </a:schemeClr>
+            </a:lnRef>
+            <a:fillRef idx="1">
+              <a:schemeClr val="accent1"/>
+            </a:fillRef>
+            <a:effectRef idx="0">
+              <a:schemeClr val="accent1"/>
+            </a:effectRef>
+            <a:fontRef idx="minor">
+              <a:schemeClr val="lt1"/>
+            </a:fontRef>
+          </p:style>
+          <p:txBody>
+            <a:bodyPr rtlCol="0" anchor="ctr"/>
+            <a:lstStyle/>
+            <a:p>
+              <a:pPr algn="ctr"/>
+              <a:endParaRPr lang="zh-TW" altLang="en-US"/>
+            </a:p>
+          </p:txBody>
+        </p:sp>
+        <p:sp>
+          <p:nvSpPr>
+            <p:cNvPr id="34" name="橢圓 33">
+              <a:extLst>
+                <a:ext uri="{FF2B5EF4-FFF2-40B4-BE49-F238E27FC236}">
+                  <a16:creationId xmlns:a16="http://schemas.microsoft.com/office/drawing/2014/main" id="{01CA510A-4B15-4B6F-B324-F1D18696723B}"/>
+                </a:ext>
+              </a:extLst>
+            </p:cNvPr>
+            <p:cNvSpPr/>
+            <p:nvPr/>
+          </p:nvSpPr>
+          <p:spPr>
+            <a:xfrm>
+              <a:off x="5889170" y="4303671"/>
+              <a:ext cx="165463" cy="182880"/>
+            </a:xfrm>
+            <a:prstGeom prst="ellipse">
+              <a:avLst/>
+            </a:prstGeom>
+            <a:solidFill>
+              <a:srgbClr val="92D050"/>
+            </a:solidFill>
+          </p:spPr>
+          <p:style>
+            <a:lnRef idx="2">
+              <a:schemeClr val="accent1">
+                <a:shade val="50000"/>
+              </a:schemeClr>
+            </a:lnRef>
+            <a:fillRef idx="1">
+              <a:schemeClr val="accent1"/>
+            </a:fillRef>
+            <a:effectRef idx="0">
+              <a:schemeClr val="accent1"/>
+            </a:effectRef>
+            <a:fontRef idx="minor">
+              <a:schemeClr val="lt1"/>
+            </a:fontRef>
+          </p:style>
+          <p:txBody>
+            <a:bodyPr rtlCol="0" anchor="ctr"/>
+            <a:lstStyle/>
+            <a:p>
+              <a:pPr algn="ctr"/>
+              <a:endParaRPr lang="zh-TW" altLang="en-US"/>
+            </a:p>
+          </p:txBody>
+        </p:sp>
+        <p:sp>
+          <p:nvSpPr>
+            <p:cNvPr id="35" name="橢圓 34">
+              <a:extLst>
+                <a:ext uri="{FF2B5EF4-FFF2-40B4-BE49-F238E27FC236}">
+                  <a16:creationId xmlns:a16="http://schemas.microsoft.com/office/drawing/2014/main" id="{BF0BCF39-74F3-4BD1-B882-1DDA209CE5F4}"/>
+                </a:ext>
+              </a:extLst>
+            </p:cNvPr>
+            <p:cNvSpPr/>
+            <p:nvPr/>
+          </p:nvSpPr>
+          <p:spPr>
+            <a:xfrm>
+              <a:off x="5423261" y="4517031"/>
+              <a:ext cx="165463" cy="182880"/>
+            </a:xfrm>
+            <a:prstGeom prst="ellipse">
+              <a:avLst/>
+            </a:prstGeom>
+            <a:solidFill>
+              <a:srgbClr val="92D050"/>
+            </a:solidFill>
+          </p:spPr>
+          <p:style>
+            <a:lnRef idx="2">
+              <a:schemeClr val="accent1">
+                <a:shade val="50000"/>
+              </a:schemeClr>
+            </a:lnRef>
+            <a:fillRef idx="1">
+              <a:schemeClr val="accent1"/>
+            </a:fillRef>
+            <a:effectRef idx="0">
+              <a:schemeClr val="accent1"/>
+            </a:effectRef>
+            <a:fontRef idx="minor">
+              <a:schemeClr val="lt1"/>
+            </a:fontRef>
+          </p:style>
+          <p:txBody>
+            <a:bodyPr rtlCol="0" anchor="ctr"/>
+            <a:lstStyle/>
+            <a:p>
+              <a:pPr algn="ctr"/>
+              <a:endParaRPr lang="zh-TW" altLang="en-US"/>
+            </a:p>
+          </p:txBody>
+        </p:sp>
+        <p:sp>
+          <p:nvSpPr>
+            <p:cNvPr id="36" name="橢圓 35">
+              <a:extLst>
+                <a:ext uri="{FF2B5EF4-FFF2-40B4-BE49-F238E27FC236}">
+                  <a16:creationId xmlns:a16="http://schemas.microsoft.com/office/drawing/2014/main" id="{A9A1224A-1C5C-4287-9F80-9133F0E5D6A1}"/>
+                </a:ext>
+              </a:extLst>
+            </p:cNvPr>
+            <p:cNvSpPr/>
+            <p:nvPr/>
+          </p:nvSpPr>
+          <p:spPr>
+            <a:xfrm>
+              <a:off x="5941420" y="3615688"/>
+              <a:ext cx="165463" cy="182880"/>
+            </a:xfrm>
+            <a:prstGeom prst="ellipse">
+              <a:avLst/>
+            </a:prstGeom>
+            <a:solidFill>
+              <a:srgbClr val="92D050"/>
+            </a:solidFill>
+            <a:ln>
+              <a:solidFill>
+                <a:srgbClr val="FF0000"/>
+              </a:solidFill>
+            </a:ln>
+          </p:spPr>
+          <p:style>
+            <a:lnRef idx="2">
+              <a:schemeClr val="accent1">
+                <a:shade val="50000"/>
+              </a:schemeClr>
+            </a:lnRef>
+            <a:fillRef idx="1">
+              <a:schemeClr val="accent1"/>
+            </a:fillRef>
+            <a:effectRef idx="0">
+              <a:schemeClr val="accent1"/>
+            </a:effectRef>
+            <a:fontRef idx="minor">
+              <a:schemeClr val="lt1"/>
+            </a:fontRef>
+          </p:style>
+          <p:txBody>
+            <a:bodyPr rtlCol="0" anchor="ctr"/>
+            <a:lstStyle/>
+            <a:p>
+              <a:pPr algn="ctr"/>
+              <a:endParaRPr lang="zh-TW" altLang="en-US"/>
+            </a:p>
+          </p:txBody>
+        </p:sp>
+        <p:sp>
+          <p:nvSpPr>
+            <p:cNvPr id="37" name="橢圓 36">
+              <a:extLst>
+                <a:ext uri="{FF2B5EF4-FFF2-40B4-BE49-F238E27FC236}">
+                  <a16:creationId xmlns:a16="http://schemas.microsoft.com/office/drawing/2014/main" id="{D3B34D60-4972-4558-873F-0FC26092091F}"/>
+                </a:ext>
+              </a:extLst>
+            </p:cNvPr>
+            <p:cNvSpPr/>
+            <p:nvPr/>
+          </p:nvSpPr>
+          <p:spPr>
+            <a:xfrm>
+              <a:off x="6093820" y="4090307"/>
+              <a:ext cx="165463" cy="182880"/>
+            </a:xfrm>
+            <a:prstGeom prst="ellipse">
+              <a:avLst/>
+            </a:prstGeom>
+            <a:solidFill>
+              <a:srgbClr val="92D050"/>
+            </a:solidFill>
+          </p:spPr>
+          <p:style>
+            <a:lnRef idx="2">
+              <a:schemeClr val="accent1">
+                <a:shade val="50000"/>
+              </a:schemeClr>
+            </a:lnRef>
+            <a:fillRef idx="1">
+              <a:schemeClr val="accent1"/>
+            </a:fillRef>
+            <a:effectRef idx="0">
+              <a:schemeClr val="accent1"/>
+            </a:effectRef>
+            <a:fontRef idx="minor">
+              <a:schemeClr val="lt1"/>
+            </a:fontRef>
+          </p:style>
+          <p:txBody>
+            <a:bodyPr rtlCol="0" anchor="ctr"/>
+            <a:lstStyle/>
+            <a:p>
+              <a:pPr algn="ctr"/>
+              <a:endParaRPr lang="zh-TW" altLang="en-US"/>
+            </a:p>
+          </p:txBody>
+        </p:sp>
+        <p:sp>
+          <p:nvSpPr>
+            <p:cNvPr id="38" name="橢圓 37">
+              <a:extLst>
+                <a:ext uri="{FF2B5EF4-FFF2-40B4-BE49-F238E27FC236}">
+                  <a16:creationId xmlns:a16="http://schemas.microsoft.com/office/drawing/2014/main" id="{5DAE163D-0055-48D3-ADA8-CF58DB83F04E}"/>
+                </a:ext>
+              </a:extLst>
+            </p:cNvPr>
+            <p:cNvSpPr/>
+            <p:nvPr/>
+          </p:nvSpPr>
+          <p:spPr>
+            <a:xfrm>
+              <a:off x="5627911" y="4303667"/>
+              <a:ext cx="165463" cy="182880"/>
+            </a:xfrm>
+            <a:prstGeom prst="ellipse">
+              <a:avLst/>
+            </a:prstGeom>
+            <a:solidFill>
+              <a:srgbClr val="92D050"/>
+            </a:solidFill>
+          </p:spPr>
+          <p:style>
+            <a:lnRef idx="2">
+              <a:schemeClr val="accent1">
+                <a:shade val="50000"/>
+              </a:schemeClr>
+            </a:lnRef>
+            <a:fillRef idx="1">
+              <a:schemeClr val="accent1"/>
+            </a:fillRef>
+            <a:effectRef idx="0">
+              <a:schemeClr val="accent1"/>
+            </a:effectRef>
+            <a:fontRef idx="minor">
+              <a:schemeClr val="lt1"/>
+            </a:fontRef>
+          </p:style>
+          <p:txBody>
+            <a:bodyPr rtlCol="0" anchor="ctr"/>
+            <a:lstStyle/>
+            <a:p>
+              <a:pPr algn="ctr"/>
+              <a:endParaRPr lang="zh-TW" altLang="en-US"/>
+            </a:p>
+          </p:txBody>
+        </p:sp>
+        <p:sp>
+          <p:nvSpPr>
+            <p:cNvPr id="39" name="橢圓 38">
+              <a:extLst>
+                <a:ext uri="{FF2B5EF4-FFF2-40B4-BE49-F238E27FC236}">
+                  <a16:creationId xmlns:a16="http://schemas.microsoft.com/office/drawing/2014/main" id="{8863D55B-5B2B-4B23-9E09-4722A450B2B6}"/>
+                </a:ext>
+              </a:extLst>
+            </p:cNvPr>
+            <p:cNvSpPr/>
+            <p:nvPr/>
+          </p:nvSpPr>
+          <p:spPr>
+            <a:xfrm>
+              <a:off x="5780311" y="4908914"/>
+              <a:ext cx="165463" cy="182880"/>
+            </a:xfrm>
+            <a:prstGeom prst="ellipse">
+              <a:avLst/>
+            </a:prstGeom>
+            <a:solidFill>
+              <a:srgbClr val="92D050"/>
+            </a:solidFill>
+          </p:spPr>
+          <p:style>
+            <a:lnRef idx="2">
+              <a:schemeClr val="accent1">
+                <a:shade val="50000"/>
+              </a:schemeClr>
+            </a:lnRef>
+            <a:fillRef idx="1">
+              <a:schemeClr val="accent1"/>
+            </a:fillRef>
+            <a:effectRef idx="0">
+              <a:schemeClr val="accent1"/>
+            </a:effectRef>
+            <a:fontRef idx="minor">
+              <a:schemeClr val="lt1"/>
+            </a:fontRef>
+          </p:style>
+          <p:txBody>
+            <a:bodyPr rtlCol="0" anchor="ctr"/>
+            <a:lstStyle/>
+            <a:p>
+              <a:pPr algn="ctr"/>
+              <a:endParaRPr lang="zh-TW" altLang="en-US"/>
+            </a:p>
+          </p:txBody>
+        </p:sp>
+        <p:sp>
+          <p:nvSpPr>
+            <p:cNvPr id="40" name="橢圓 39">
+              <a:extLst>
+                <a:ext uri="{FF2B5EF4-FFF2-40B4-BE49-F238E27FC236}">
+                  <a16:creationId xmlns:a16="http://schemas.microsoft.com/office/drawing/2014/main" id="{516F397F-85B1-4EC5-A86C-13E6B74ED7A3}"/>
+                </a:ext>
+              </a:extLst>
+            </p:cNvPr>
+            <p:cNvSpPr/>
+            <p:nvPr/>
+          </p:nvSpPr>
+          <p:spPr>
+            <a:xfrm>
+              <a:off x="5889170" y="3981452"/>
+              <a:ext cx="165463" cy="182880"/>
+            </a:xfrm>
+            <a:prstGeom prst="ellipse">
+              <a:avLst/>
+            </a:prstGeom>
+            <a:solidFill>
+              <a:srgbClr val="92D050"/>
+            </a:solidFill>
+          </p:spPr>
+          <p:style>
+            <a:lnRef idx="2">
+              <a:schemeClr val="accent1">
+                <a:shade val="50000"/>
+              </a:schemeClr>
+            </a:lnRef>
+            <a:fillRef idx="1">
+              <a:schemeClr val="accent1"/>
+            </a:fillRef>
+            <a:effectRef idx="0">
+              <a:schemeClr val="accent1"/>
+            </a:effectRef>
+            <a:fontRef idx="minor">
+              <a:schemeClr val="lt1"/>
+            </a:fontRef>
+          </p:style>
+          <p:txBody>
+            <a:bodyPr rtlCol="0" anchor="ctr"/>
+            <a:lstStyle/>
+            <a:p>
+              <a:pPr algn="ctr"/>
+              <a:endParaRPr lang="zh-TW" altLang="en-US"/>
+            </a:p>
+          </p:txBody>
+        </p:sp>
+        <p:sp>
+          <p:nvSpPr>
+            <p:cNvPr id="41" name="橢圓 40">
+              <a:extLst>
+                <a:ext uri="{FF2B5EF4-FFF2-40B4-BE49-F238E27FC236}">
+                  <a16:creationId xmlns:a16="http://schemas.microsoft.com/office/drawing/2014/main" id="{78E2569D-90DC-4778-B0C5-E5ED306E0CF6}"/>
+                </a:ext>
+              </a:extLst>
+            </p:cNvPr>
+            <p:cNvSpPr/>
+            <p:nvPr/>
+          </p:nvSpPr>
+          <p:spPr>
+            <a:xfrm>
+              <a:off x="6041570" y="4456071"/>
+              <a:ext cx="165463" cy="182880"/>
+            </a:xfrm>
+            <a:prstGeom prst="ellipse">
+              <a:avLst/>
+            </a:prstGeom>
+            <a:solidFill>
+              <a:srgbClr val="92D050"/>
+            </a:solidFill>
+          </p:spPr>
+          <p:style>
+            <a:lnRef idx="2">
+              <a:schemeClr val="accent1">
+                <a:shade val="50000"/>
+              </a:schemeClr>
+            </a:lnRef>
+            <a:fillRef idx="1">
+              <a:schemeClr val="accent1"/>
+            </a:fillRef>
+            <a:effectRef idx="0">
+              <a:schemeClr val="accent1"/>
+            </a:effectRef>
+            <a:fontRef idx="minor">
+              <a:schemeClr val="lt1"/>
+            </a:fontRef>
+          </p:style>
+          <p:txBody>
+            <a:bodyPr rtlCol="0" anchor="ctr"/>
+            <a:lstStyle/>
+            <a:p>
+              <a:pPr algn="ctr"/>
+              <a:endParaRPr lang="zh-TW" altLang="en-US"/>
+            </a:p>
+          </p:txBody>
+        </p:sp>
+        <p:sp>
+          <p:nvSpPr>
+            <p:cNvPr id="42" name="橢圓 41">
+              <a:extLst>
+                <a:ext uri="{FF2B5EF4-FFF2-40B4-BE49-F238E27FC236}">
+                  <a16:creationId xmlns:a16="http://schemas.microsoft.com/office/drawing/2014/main" id="{E3E894A8-1427-4C5D-8F35-760AF1CE9129}"/>
+                </a:ext>
+              </a:extLst>
+            </p:cNvPr>
+            <p:cNvSpPr/>
+            <p:nvPr/>
+          </p:nvSpPr>
+          <p:spPr>
+            <a:xfrm>
+              <a:off x="5575661" y="4669431"/>
+              <a:ext cx="165463" cy="182880"/>
+            </a:xfrm>
+            <a:prstGeom prst="ellipse">
+              <a:avLst/>
+            </a:prstGeom>
+            <a:solidFill>
+              <a:srgbClr val="92D050"/>
+            </a:solidFill>
+          </p:spPr>
+          <p:style>
+            <a:lnRef idx="2">
+              <a:schemeClr val="accent1">
+                <a:shade val="50000"/>
+              </a:schemeClr>
+            </a:lnRef>
+            <a:fillRef idx="1">
+              <a:schemeClr val="accent1"/>
+            </a:fillRef>
+            <a:effectRef idx="0">
+              <a:schemeClr val="accent1"/>
+            </a:effectRef>
+            <a:fontRef idx="minor">
+              <a:schemeClr val="lt1"/>
+            </a:fontRef>
+          </p:style>
+          <p:txBody>
+            <a:bodyPr rtlCol="0" anchor="ctr"/>
+            <a:lstStyle/>
+            <a:p>
+              <a:pPr algn="ctr"/>
+              <a:endParaRPr lang="zh-TW" altLang="en-US"/>
+            </a:p>
+          </p:txBody>
+        </p:sp>
+        <p:sp>
+          <p:nvSpPr>
+            <p:cNvPr id="43" name="橢圓 42">
+              <a:extLst>
+                <a:ext uri="{FF2B5EF4-FFF2-40B4-BE49-F238E27FC236}">
+                  <a16:creationId xmlns:a16="http://schemas.microsoft.com/office/drawing/2014/main" id="{DF6F32C0-DA6E-47A0-83BD-194C8490300F}"/>
+                </a:ext>
+              </a:extLst>
+            </p:cNvPr>
+            <p:cNvSpPr/>
+            <p:nvPr/>
+          </p:nvSpPr>
+          <p:spPr>
+            <a:xfrm>
+              <a:off x="6093820" y="3768088"/>
+              <a:ext cx="165463" cy="182880"/>
+            </a:xfrm>
+            <a:prstGeom prst="ellipse">
+              <a:avLst/>
+            </a:prstGeom>
+            <a:solidFill>
+              <a:srgbClr val="92D050"/>
+            </a:solidFill>
+          </p:spPr>
+          <p:style>
+            <a:lnRef idx="2">
+              <a:schemeClr val="accent1">
+                <a:shade val="50000"/>
+              </a:schemeClr>
+            </a:lnRef>
+            <a:fillRef idx="1">
+              <a:schemeClr val="accent1"/>
+            </a:fillRef>
+            <a:effectRef idx="0">
+              <a:schemeClr val="accent1"/>
+            </a:effectRef>
+            <a:fontRef idx="minor">
+              <a:schemeClr val="lt1"/>
+            </a:fontRef>
+          </p:style>
+          <p:txBody>
+            <a:bodyPr rtlCol="0" anchor="ctr"/>
+            <a:lstStyle/>
+            <a:p>
+              <a:pPr algn="ctr"/>
+              <a:endParaRPr lang="zh-TW" altLang="en-US"/>
+            </a:p>
+          </p:txBody>
+        </p:sp>
+        <p:sp>
+          <p:nvSpPr>
+            <p:cNvPr id="44" name="橢圓 43">
+              <a:extLst>
+                <a:ext uri="{FF2B5EF4-FFF2-40B4-BE49-F238E27FC236}">
+                  <a16:creationId xmlns:a16="http://schemas.microsoft.com/office/drawing/2014/main" id="{EC14CDBD-E35D-49C8-BAEF-BE50B7B27D2D}"/>
+                </a:ext>
+              </a:extLst>
+            </p:cNvPr>
+            <p:cNvSpPr/>
+            <p:nvPr/>
+          </p:nvSpPr>
+          <p:spPr>
+            <a:xfrm>
+              <a:off x="6246220" y="4242707"/>
+              <a:ext cx="165463" cy="182880"/>
+            </a:xfrm>
+            <a:prstGeom prst="ellipse">
+              <a:avLst/>
+            </a:prstGeom>
+            <a:solidFill>
+              <a:srgbClr val="92D050"/>
+            </a:solidFill>
+          </p:spPr>
+          <p:style>
+            <a:lnRef idx="2">
+              <a:schemeClr val="accent1">
+                <a:shade val="50000"/>
+              </a:schemeClr>
+            </a:lnRef>
+            <a:fillRef idx="1">
+              <a:schemeClr val="accent1"/>
+            </a:fillRef>
+            <a:effectRef idx="0">
+              <a:schemeClr val="accent1"/>
+            </a:effectRef>
+            <a:fontRef idx="minor">
+              <a:schemeClr val="lt1"/>
+            </a:fontRef>
+          </p:style>
+          <p:txBody>
+            <a:bodyPr rtlCol="0" anchor="ctr"/>
+            <a:lstStyle/>
+            <a:p>
+              <a:pPr algn="ctr"/>
+              <a:endParaRPr lang="zh-TW" altLang="en-US"/>
+            </a:p>
+          </p:txBody>
+        </p:sp>
+        <p:sp>
+          <p:nvSpPr>
+            <p:cNvPr id="45" name="橢圓 44">
+              <a:extLst>
+                <a:ext uri="{FF2B5EF4-FFF2-40B4-BE49-F238E27FC236}">
+                  <a16:creationId xmlns:a16="http://schemas.microsoft.com/office/drawing/2014/main" id="{4CD81AD7-8FAD-4B16-BA72-BDA19503EC15}"/>
+                </a:ext>
+              </a:extLst>
+            </p:cNvPr>
+            <p:cNvSpPr/>
+            <p:nvPr/>
+          </p:nvSpPr>
+          <p:spPr>
+            <a:xfrm>
+              <a:off x="5780311" y="4456067"/>
+              <a:ext cx="165463" cy="182880"/>
+            </a:xfrm>
+            <a:prstGeom prst="ellipse">
+              <a:avLst/>
+            </a:prstGeom>
+            <a:solidFill>
+              <a:srgbClr val="92D050"/>
+            </a:solidFill>
+          </p:spPr>
+          <p:style>
+            <a:lnRef idx="2">
+              <a:schemeClr val="accent1">
+                <a:shade val="50000"/>
+              </a:schemeClr>
+            </a:lnRef>
+            <a:fillRef idx="1">
+              <a:schemeClr val="accent1"/>
+            </a:fillRef>
+            <a:effectRef idx="0">
+              <a:schemeClr val="accent1"/>
+            </a:effectRef>
+            <a:fontRef idx="minor">
+              <a:schemeClr val="lt1"/>
+            </a:fontRef>
+          </p:style>
+          <p:txBody>
+            <a:bodyPr rtlCol="0" anchor="ctr"/>
+            <a:lstStyle/>
+            <a:p>
+              <a:pPr algn="ctr"/>
+              <a:endParaRPr lang="zh-TW" altLang="en-US"/>
+            </a:p>
+          </p:txBody>
+        </p:sp>
+        <p:sp>
+          <p:nvSpPr>
+            <p:cNvPr id="46" name="橢圓 45">
+              <a:extLst>
+                <a:ext uri="{FF2B5EF4-FFF2-40B4-BE49-F238E27FC236}">
+                  <a16:creationId xmlns:a16="http://schemas.microsoft.com/office/drawing/2014/main" id="{310A8C4E-62D2-47B8-A601-4AC2513BC1F4}"/>
+                </a:ext>
+              </a:extLst>
+            </p:cNvPr>
+            <p:cNvSpPr/>
+            <p:nvPr/>
+          </p:nvSpPr>
+          <p:spPr>
+            <a:xfrm>
+              <a:off x="5246910" y="4456067"/>
+              <a:ext cx="165463" cy="182880"/>
+            </a:xfrm>
+            <a:prstGeom prst="ellipse">
+              <a:avLst/>
+            </a:prstGeom>
+            <a:solidFill>
+              <a:srgbClr val="92D050"/>
+            </a:solidFill>
+            <a:ln>
+              <a:solidFill>
+                <a:srgbClr val="FF0000"/>
+              </a:solidFill>
+            </a:ln>
+          </p:spPr>
+          <p:style>
+            <a:lnRef idx="2">
+              <a:schemeClr val="accent1">
+                <a:shade val="50000"/>
+              </a:schemeClr>
+            </a:lnRef>
+            <a:fillRef idx="1">
+              <a:schemeClr val="accent1"/>
+            </a:fillRef>
+            <a:effectRef idx="0">
+              <a:schemeClr val="accent1"/>
+            </a:effectRef>
+            <a:fontRef idx="minor">
+              <a:schemeClr val="lt1"/>
+            </a:fontRef>
+          </p:style>
+          <p:txBody>
+            <a:bodyPr rtlCol="0" anchor="ctr"/>
+            <a:lstStyle/>
+            <a:p>
+              <a:pPr algn="ctr"/>
+              <a:endParaRPr lang="zh-TW" altLang="en-US"/>
+            </a:p>
+          </p:txBody>
+        </p:sp>
+        <p:sp>
+          <p:nvSpPr>
+            <p:cNvPr id="47" name="橢圓 46">
+              <a:extLst>
+                <a:ext uri="{FF2B5EF4-FFF2-40B4-BE49-F238E27FC236}">
+                  <a16:creationId xmlns:a16="http://schemas.microsoft.com/office/drawing/2014/main" id="{2D385875-BFE3-4DB4-A0BF-14C85F6966B7}"/>
+                </a:ext>
+              </a:extLst>
+            </p:cNvPr>
+            <p:cNvSpPr/>
+            <p:nvPr/>
+          </p:nvSpPr>
+          <p:spPr>
+            <a:xfrm>
+              <a:off x="5451560" y="4242703"/>
+              <a:ext cx="165463" cy="182880"/>
+            </a:xfrm>
+            <a:prstGeom prst="ellipse">
+              <a:avLst/>
+            </a:prstGeom>
+            <a:solidFill>
+              <a:srgbClr val="92D050"/>
+            </a:solidFill>
+            <a:ln>
+              <a:solidFill>
+                <a:srgbClr val="FF0000"/>
+              </a:solidFill>
+            </a:ln>
+          </p:spPr>
+          <p:style>
+            <a:lnRef idx="2">
+              <a:schemeClr val="accent1">
+                <a:shade val="50000"/>
+              </a:schemeClr>
+            </a:lnRef>
+            <a:fillRef idx="1">
+              <a:schemeClr val="accent1"/>
+            </a:fillRef>
+            <a:effectRef idx="0">
+              <a:schemeClr val="accent1"/>
+            </a:effectRef>
+            <a:fontRef idx="minor">
+              <a:schemeClr val="lt1"/>
+            </a:fontRef>
+          </p:style>
+          <p:txBody>
+            <a:bodyPr rtlCol="0" anchor="ctr"/>
+            <a:lstStyle/>
+            <a:p>
+              <a:pPr algn="ctr"/>
+              <a:endParaRPr lang="zh-TW" altLang="en-US"/>
+            </a:p>
+          </p:txBody>
+        </p:sp>
+        <p:sp>
+          <p:nvSpPr>
+            <p:cNvPr id="48" name="橢圓 47">
+              <a:extLst>
+                <a:ext uri="{FF2B5EF4-FFF2-40B4-BE49-F238E27FC236}">
+                  <a16:creationId xmlns:a16="http://schemas.microsoft.com/office/drawing/2014/main" id="{0A8334B3-596C-4011-A3C7-284D5D5CC6B7}"/>
+                </a:ext>
+              </a:extLst>
+            </p:cNvPr>
+            <p:cNvSpPr/>
+            <p:nvPr/>
+          </p:nvSpPr>
+          <p:spPr>
+            <a:xfrm>
+              <a:off x="5274124" y="4817466"/>
+              <a:ext cx="165463" cy="182880"/>
+            </a:xfrm>
+            <a:prstGeom prst="ellipse">
+              <a:avLst/>
+            </a:prstGeom>
+            <a:solidFill>
+              <a:srgbClr val="92D050"/>
+            </a:solidFill>
+          </p:spPr>
+          <p:style>
+            <a:lnRef idx="2">
+              <a:schemeClr val="accent1">
+                <a:shade val="50000"/>
+              </a:schemeClr>
+            </a:lnRef>
+            <a:fillRef idx="1">
+              <a:schemeClr val="accent1"/>
+            </a:fillRef>
+            <a:effectRef idx="0">
+              <a:schemeClr val="accent1"/>
+            </a:effectRef>
+            <a:fontRef idx="minor">
+              <a:schemeClr val="lt1"/>
+            </a:fontRef>
+          </p:style>
+          <p:txBody>
+            <a:bodyPr rtlCol="0" anchor="ctr"/>
+            <a:lstStyle/>
+            <a:p>
+              <a:pPr algn="ctr"/>
+              <a:endParaRPr lang="zh-TW" altLang="en-US"/>
+            </a:p>
+          </p:txBody>
+        </p:sp>
+      </p:grpSp>
+      <p:sp>
+        <p:nvSpPr>
+          <p:cNvPr id="50" name="手繪多邊形: 圖案 49">
+            <a:extLst>
+              <a:ext uri="{FF2B5EF4-FFF2-40B4-BE49-F238E27FC236}">
+                <a16:creationId xmlns:a16="http://schemas.microsoft.com/office/drawing/2014/main" id="{92677D7C-E3AA-41AB-9900-0496C9695B85}"/>
+              </a:ext>
+            </a:extLst>
+          </p:cNvPr>
+          <p:cNvSpPr/>
+          <p:nvPr/>
         </p:nvSpPr>
-        <p:spPr/>
+        <p:spPr>
+          <a:xfrm>
+            <a:off x="3910149" y="2934789"/>
+            <a:ext cx="2447108" cy="2699657"/>
+          </a:xfrm>
+          <a:custGeom>
+            <a:avLst/>
+            <a:gdLst>
+              <a:gd name="connsiteX0" fmla="*/ 2447108 w 2447108"/>
+              <a:gd name="connsiteY0" fmla="*/ 0 h 2699657"/>
+              <a:gd name="connsiteX1" fmla="*/ 2133600 w 2447108"/>
+              <a:gd name="connsiteY1" fmla="*/ 78377 h 2699657"/>
+              <a:gd name="connsiteX2" fmla="*/ 1950720 w 2447108"/>
+              <a:gd name="connsiteY2" fmla="*/ 278674 h 2699657"/>
+              <a:gd name="connsiteX3" fmla="*/ 1898468 w 2447108"/>
+              <a:gd name="connsiteY3" fmla="*/ 505097 h 2699657"/>
+              <a:gd name="connsiteX4" fmla="*/ 1828800 w 2447108"/>
+              <a:gd name="connsiteY4" fmla="*/ 696685 h 2699657"/>
+              <a:gd name="connsiteX5" fmla="*/ 1776548 w 2447108"/>
+              <a:gd name="connsiteY5" fmla="*/ 966651 h 2699657"/>
+              <a:gd name="connsiteX6" fmla="*/ 1741714 w 2447108"/>
+              <a:gd name="connsiteY6" fmla="*/ 1149531 h 2699657"/>
+              <a:gd name="connsiteX7" fmla="*/ 1672045 w 2447108"/>
+              <a:gd name="connsiteY7" fmla="*/ 1219200 h 2699657"/>
+              <a:gd name="connsiteX8" fmla="*/ 1593668 w 2447108"/>
+              <a:gd name="connsiteY8" fmla="*/ 1262742 h 2699657"/>
+              <a:gd name="connsiteX9" fmla="*/ 1332411 w 2447108"/>
+              <a:gd name="connsiteY9" fmla="*/ 1332411 h 2699657"/>
+              <a:gd name="connsiteX10" fmla="*/ 1245325 w 2447108"/>
+              <a:gd name="connsiteY10" fmla="*/ 1463040 h 2699657"/>
+              <a:gd name="connsiteX11" fmla="*/ 1254034 w 2447108"/>
+              <a:gd name="connsiteY11" fmla="*/ 1567542 h 2699657"/>
+              <a:gd name="connsiteX12" fmla="*/ 1288868 w 2447108"/>
+              <a:gd name="connsiteY12" fmla="*/ 1706880 h 2699657"/>
+              <a:gd name="connsiteX13" fmla="*/ 1297577 w 2447108"/>
+              <a:gd name="connsiteY13" fmla="*/ 1863634 h 2699657"/>
+              <a:gd name="connsiteX14" fmla="*/ 1288868 w 2447108"/>
+              <a:gd name="connsiteY14" fmla="*/ 1968137 h 2699657"/>
+              <a:gd name="connsiteX15" fmla="*/ 1219200 w 2447108"/>
+              <a:gd name="connsiteY15" fmla="*/ 2116182 h 2699657"/>
+              <a:gd name="connsiteX16" fmla="*/ 1193074 w 2447108"/>
+              <a:gd name="connsiteY16" fmla="*/ 2194560 h 2699657"/>
+              <a:gd name="connsiteX17" fmla="*/ 1149531 w 2447108"/>
+              <a:gd name="connsiteY17" fmla="*/ 2307771 h 2699657"/>
+              <a:gd name="connsiteX18" fmla="*/ 1079862 w 2447108"/>
+              <a:gd name="connsiteY18" fmla="*/ 2377440 h 2699657"/>
+              <a:gd name="connsiteX19" fmla="*/ 1001485 w 2447108"/>
+              <a:gd name="connsiteY19" fmla="*/ 2438400 h 2699657"/>
+              <a:gd name="connsiteX20" fmla="*/ 0 w 2447108"/>
+              <a:gd name="connsiteY20" fmla="*/ 2699657 h 2699657"/>
+            </a:gdLst>
+            <a:ahLst/>
+            <a:cxnLst>
+              <a:cxn ang="0">
+                <a:pos x="connsiteX0" y="connsiteY0"/>
+              </a:cxn>
+              <a:cxn ang="0">
+                <a:pos x="connsiteX1" y="connsiteY1"/>
+              </a:cxn>
+              <a:cxn ang="0">
+                <a:pos x="connsiteX2" y="connsiteY2"/>
+              </a:cxn>
+              <a:cxn ang="0">
+                <a:pos x="connsiteX3" y="connsiteY3"/>
+              </a:cxn>
+              <a:cxn ang="0">
+                <a:pos x="connsiteX4" y="connsiteY4"/>
+              </a:cxn>
+              <a:cxn ang="0">
+                <a:pos x="connsiteX5" y="connsiteY5"/>
+              </a:cxn>
+              <a:cxn ang="0">
+                <a:pos x="connsiteX6" y="connsiteY6"/>
+              </a:cxn>
+              <a:cxn ang="0">
+                <a:pos x="connsiteX7" y="connsiteY7"/>
+              </a:cxn>
+              <a:cxn ang="0">
+                <a:pos x="connsiteX8" y="connsiteY8"/>
+              </a:cxn>
+              <a:cxn ang="0">
+                <a:pos x="connsiteX9" y="connsiteY9"/>
+              </a:cxn>
+              <a:cxn ang="0">
+                <a:pos x="connsiteX10" y="connsiteY10"/>
+              </a:cxn>
+              <a:cxn ang="0">
+                <a:pos x="connsiteX11" y="connsiteY11"/>
+              </a:cxn>
+              <a:cxn ang="0">
+                <a:pos x="connsiteX12" y="connsiteY12"/>
+              </a:cxn>
+              <a:cxn ang="0">
+                <a:pos x="connsiteX13" y="connsiteY13"/>
+              </a:cxn>
+              <a:cxn ang="0">
+                <a:pos x="connsiteX14" y="connsiteY14"/>
+              </a:cxn>
+              <a:cxn ang="0">
+                <a:pos x="connsiteX15" y="connsiteY15"/>
+              </a:cxn>
+              <a:cxn ang="0">
+                <a:pos x="connsiteX16" y="connsiteY16"/>
+              </a:cxn>
+              <a:cxn ang="0">
+                <a:pos x="connsiteX17" y="connsiteY17"/>
+              </a:cxn>
+              <a:cxn ang="0">
+                <a:pos x="connsiteX18" y="connsiteY18"/>
+              </a:cxn>
+              <a:cxn ang="0">
+                <a:pos x="connsiteX19" y="connsiteY19"/>
+              </a:cxn>
+              <a:cxn ang="0">
+                <a:pos x="connsiteX20" y="connsiteY20"/>
+              </a:cxn>
+            </a:cxnLst>
+            <a:rect l="l" t="t" r="r" b="b"/>
+            <a:pathLst>
+              <a:path w="2447108" h="2699657">
+                <a:moveTo>
+                  <a:pt x="2447108" y="0"/>
+                </a:moveTo>
+                <a:cubicBezTo>
+                  <a:pt x="2331719" y="15965"/>
+                  <a:pt x="2216331" y="31931"/>
+                  <a:pt x="2133600" y="78377"/>
+                </a:cubicBezTo>
+                <a:cubicBezTo>
+                  <a:pt x="2050869" y="124823"/>
+                  <a:pt x="1989909" y="207554"/>
+                  <a:pt x="1950720" y="278674"/>
+                </a:cubicBezTo>
+                <a:cubicBezTo>
+                  <a:pt x="1911531" y="349794"/>
+                  <a:pt x="1918788" y="435429"/>
+                  <a:pt x="1898468" y="505097"/>
+                </a:cubicBezTo>
+                <a:cubicBezTo>
+                  <a:pt x="1878148" y="574765"/>
+                  <a:pt x="1849120" y="619759"/>
+                  <a:pt x="1828800" y="696685"/>
+                </a:cubicBezTo>
+                <a:cubicBezTo>
+                  <a:pt x="1808480" y="773611"/>
+                  <a:pt x="1791062" y="891177"/>
+                  <a:pt x="1776548" y="966651"/>
+                </a:cubicBezTo>
+                <a:cubicBezTo>
+                  <a:pt x="1762034" y="1042125"/>
+                  <a:pt x="1759131" y="1107440"/>
+                  <a:pt x="1741714" y="1149531"/>
+                </a:cubicBezTo>
+                <a:cubicBezTo>
+                  <a:pt x="1724297" y="1191622"/>
+                  <a:pt x="1696719" y="1200332"/>
+                  <a:pt x="1672045" y="1219200"/>
+                </a:cubicBezTo>
+                <a:cubicBezTo>
+                  <a:pt x="1647371" y="1238068"/>
+                  <a:pt x="1650274" y="1243874"/>
+                  <a:pt x="1593668" y="1262742"/>
+                </a:cubicBezTo>
+                <a:cubicBezTo>
+                  <a:pt x="1537062" y="1281611"/>
+                  <a:pt x="1390468" y="1299028"/>
+                  <a:pt x="1332411" y="1332411"/>
+                </a:cubicBezTo>
+                <a:cubicBezTo>
+                  <a:pt x="1274354" y="1365794"/>
+                  <a:pt x="1258388" y="1423852"/>
+                  <a:pt x="1245325" y="1463040"/>
+                </a:cubicBezTo>
+                <a:cubicBezTo>
+                  <a:pt x="1232262" y="1502228"/>
+                  <a:pt x="1246777" y="1526902"/>
+                  <a:pt x="1254034" y="1567542"/>
+                </a:cubicBezTo>
+                <a:cubicBezTo>
+                  <a:pt x="1261291" y="1608182"/>
+                  <a:pt x="1281611" y="1657531"/>
+                  <a:pt x="1288868" y="1706880"/>
+                </a:cubicBezTo>
+                <a:cubicBezTo>
+                  <a:pt x="1296125" y="1756229"/>
+                  <a:pt x="1297577" y="1820091"/>
+                  <a:pt x="1297577" y="1863634"/>
+                </a:cubicBezTo>
+                <a:cubicBezTo>
+                  <a:pt x="1297577" y="1907177"/>
+                  <a:pt x="1301931" y="1926046"/>
+                  <a:pt x="1288868" y="1968137"/>
+                </a:cubicBezTo>
+                <a:cubicBezTo>
+                  <a:pt x="1275805" y="2010228"/>
+                  <a:pt x="1235166" y="2078445"/>
+                  <a:pt x="1219200" y="2116182"/>
+                </a:cubicBezTo>
+                <a:cubicBezTo>
+                  <a:pt x="1203234" y="2153919"/>
+                  <a:pt x="1204685" y="2162629"/>
+                  <a:pt x="1193074" y="2194560"/>
+                </a:cubicBezTo>
+                <a:cubicBezTo>
+                  <a:pt x="1181463" y="2226491"/>
+                  <a:pt x="1168400" y="2277291"/>
+                  <a:pt x="1149531" y="2307771"/>
+                </a:cubicBezTo>
+                <a:cubicBezTo>
+                  <a:pt x="1130662" y="2338251"/>
+                  <a:pt x="1104536" y="2355669"/>
+                  <a:pt x="1079862" y="2377440"/>
+                </a:cubicBezTo>
+                <a:cubicBezTo>
+                  <a:pt x="1055188" y="2399212"/>
+                  <a:pt x="1181462" y="2384697"/>
+                  <a:pt x="1001485" y="2438400"/>
+                </a:cubicBezTo>
+                <a:cubicBezTo>
+                  <a:pt x="821508" y="2492103"/>
+                  <a:pt x="410754" y="2595880"/>
+                  <a:pt x="0" y="2699657"/>
+                </a:cubicBezTo>
+              </a:path>
+            </a:pathLst>
+          </a:custGeom>
+          <a:noFill/>
+          <a:ln>
+            <a:solidFill>
+              <a:srgbClr val="FF0000"/>
+            </a:solidFill>
+          </a:ln>
+        </p:spPr>
+        <p:style>
+          <a:lnRef idx="2">
+            <a:schemeClr val="accent1">
+              <a:shade val="50000"/>
+            </a:schemeClr>
+          </a:lnRef>
+          <a:fillRef idx="1">
+            <a:schemeClr val="accent1"/>
+          </a:fillRef>
+          <a:effectRef idx="0">
+            <a:schemeClr val="accent1"/>
+          </a:effectRef>
+          <a:fontRef idx="minor">
+            <a:schemeClr val="lt1"/>
+          </a:fontRef>
+        </p:style>
         <p:txBody>
-          <a:bodyPr/>
+          <a:bodyPr rtlCol="0" anchor="ctr"/>
           <a:lstStyle/>
           <a:p>
-            <a:endParaRPr lang="zh-TW" altLang="en-US" dirty="0"/>
+            <a:pPr algn="ctr"/>
+            <a:endParaRPr lang="zh-TW" altLang="en-US"/>
           </a:p>
         </p:txBody>
       </p:sp>
+      <p:sp>
+        <p:nvSpPr>
+          <p:cNvPr id="51" name="文字方塊 50">
+            <a:extLst>
+              <a:ext uri="{FF2B5EF4-FFF2-40B4-BE49-F238E27FC236}">
+                <a16:creationId xmlns:a16="http://schemas.microsoft.com/office/drawing/2014/main" id="{66F62D00-5F4D-4864-81D5-D57BC030C4A0}"/>
+              </a:ext>
+            </a:extLst>
+          </p:cNvPr>
+          <p:cNvSpPr txBox="1"/>
+          <p:nvPr/>
+        </p:nvSpPr>
+        <p:spPr>
+          <a:xfrm>
+            <a:off x="8046719" y="3290887"/>
+            <a:ext cx="1436914" cy="646331"/>
+          </a:xfrm>
+          <a:prstGeom prst="rect">
+            <a:avLst/>
+          </a:prstGeom>
+          <a:noFill/>
+        </p:spPr>
+        <p:txBody>
+          <a:bodyPr wrap="square" rtlCol="0">
+            <a:spAutoFit/>
+          </a:bodyPr>
+          <a:lstStyle/>
+          <a:p>
+            <a:r>
+              <a:rPr lang="en-US" altLang="zh-TW" dirty="0"/>
+              <a:t>Support vector</a:t>
+            </a:r>
+            <a:endParaRPr lang="zh-TW" altLang="en-US" dirty="0"/>
+          </a:p>
+        </p:txBody>
+      </p:sp>
+      <p:cxnSp>
+        <p:nvCxnSpPr>
+          <p:cNvPr id="53" name="直線單箭頭接點 52">
+            <a:extLst>
+              <a:ext uri="{FF2B5EF4-FFF2-40B4-BE49-F238E27FC236}">
+                <a16:creationId xmlns:a16="http://schemas.microsoft.com/office/drawing/2014/main" id="{0A81630D-8EC8-4D73-8A20-1AF7506BB6D7}"/>
+              </a:ext>
+            </a:extLst>
+          </p:cNvPr>
+          <p:cNvCxnSpPr>
+            <a:endCxn id="51" idx="1"/>
+          </p:cNvCxnSpPr>
+          <p:nvPr/>
+        </p:nvCxnSpPr>
+        <p:spPr>
+          <a:xfrm flipV="1">
+            <a:off x="6106883" y="3614053"/>
+            <a:ext cx="1939836" cy="30484"/>
+          </a:xfrm>
+          <a:prstGeom prst="straightConnector1">
+            <a:avLst/>
+          </a:prstGeom>
+          <a:ln>
+            <a:solidFill>
+              <a:srgbClr val="FF0000"/>
+            </a:solidFill>
+            <a:tailEnd type="triangle"/>
+          </a:ln>
+        </p:spPr>
+        <p:style>
+          <a:lnRef idx="1">
+            <a:schemeClr val="accent1"/>
+          </a:lnRef>
+          <a:fillRef idx="0">
+            <a:schemeClr val="accent1"/>
+          </a:fillRef>
+          <a:effectRef idx="0">
+            <a:schemeClr val="accent1"/>
+          </a:effectRef>
+          <a:fontRef idx="minor">
+            <a:schemeClr val="tx1"/>
+          </a:fontRef>
+        </p:style>
+      </p:cxnSp>
     </p:spTree>
     <p:extLst>
       <p:ext uri="{BB962C8B-B14F-4D97-AF65-F5344CB8AC3E}">
@@ -13548,7 +16141,7 @@
           <a:p>
             <a:fld id="{F26ACB28-5909-4D06-AF8E-D1945958D451}" type="datetime1">
               <a:rPr lang="zh-TW" altLang="en-US" smtClean="0"/>
-              <a:t>2020/8/17</a:t>
+              <a:t>2020/11/20</a:t>
             </a:fld>
             <a:endParaRPr lang="ko-KR" altLang="en-US"/>
           </a:p>
@@ -17261,7 +19854,7 @@
           <a:p>
             <a:fld id="{F26ACB28-5909-4D06-AF8E-D1945958D451}" type="datetime1">
               <a:rPr lang="zh-TW" altLang="en-US" smtClean="0"/>
-              <a:t>2020/8/17</a:t>
+              <a:t>2020/11/20</a:t>
             </a:fld>
             <a:endParaRPr lang="ko-KR" altLang="en-US"/>
           </a:p>
@@ -25080,7 +27673,7 @@
           <a:p>
             <a:fld id="{A647AF25-3F89-4DC6-8B43-05E1D9B67F85}" type="datetime1">
               <a:rPr lang="zh-TW" altLang="en-US" smtClean="0"/>
-              <a:t>2020/8/17</a:t>
+              <a:t>2020/11/20</a:t>
             </a:fld>
             <a:endParaRPr lang="ko-KR" altLang="en-US"/>
           </a:p>

</xml_diff>